<commit_message>
forgot to save slide before commit
</commit_message>
<xml_diff>
--- a/slide/evfs_talk.pptx
+++ b/slide/evfs_talk.pptx
@@ -5,7 +5,7 @@
     <p:sldMasterId id="2147483660" r:id="rId1"/>
   </p:sldMasterIdLst>
   <p:notesMasterIdLst>
-    <p:notesMasterId r:id="rId34"/>
+    <p:notesMasterId r:id="rId30"/>
   </p:notesMasterIdLst>
   <p:sldIdLst>
     <p:sldId id="256" r:id="rId2"/>
@@ -36,10 +36,6 @@
     <p:sldId id="370" r:id="rId27"/>
     <p:sldId id="332" r:id="rId28"/>
     <p:sldId id="347" r:id="rId29"/>
-    <p:sldId id="361" r:id="rId30"/>
-    <p:sldId id="362" r:id="rId31"/>
-    <p:sldId id="363" r:id="rId32"/>
-    <p:sldId id="364" r:id="rId33"/>
   </p:sldIdLst>
   <p:sldSz cx="12192000" cy="6858000"/>
   <p:notesSz cx="6858000" cy="9144000"/>
@@ -171,10 +167,6 @@
             <p14:sldId id="370"/>
             <p14:sldId id="332"/>
             <p14:sldId id="347"/>
-            <p14:sldId id="361"/>
-            <p14:sldId id="362"/>
-            <p14:sldId id="363"/>
-            <p14:sldId id="364"/>
           </p14:sldIdLst>
         </p14:section>
       </p14:sectionLst>
@@ -402,11 +394,11 @@
         </c:dLbls>
         <c:marker val="1"/>
         <c:smooth val="0"/>
-        <c:axId val="-542709312"/>
-        <c:axId val="-542708224"/>
+        <c:axId val="-1049889904"/>
+        <c:axId val="-1049882832"/>
       </c:lineChart>
       <c:catAx>
-        <c:axId val="-542709312"/>
+        <c:axId val="-1049889904"/>
         <c:scaling>
           <c:orientation val="minMax"/>
         </c:scaling>
@@ -507,7 +499,7 @@
             <a:endParaRPr lang="en-US"/>
           </a:p>
         </c:txPr>
-        <c:crossAx val="-542708224"/>
+        <c:crossAx val="-1049882832"/>
         <c:crosses val="autoZero"/>
         <c:auto val="0"/>
         <c:lblAlgn val="ctr"/>
@@ -515,7 +507,7 @@
         <c:noMultiLvlLbl val="0"/>
       </c:catAx>
       <c:valAx>
-        <c:axId val="-542708224"/>
+        <c:axId val="-1049882832"/>
         <c:scaling>
           <c:logBase val="4"/>
           <c:orientation val="minMax"/>
@@ -558,6 +550,7 @@
               </a:p>
             </c:rich>
           </c:tx>
+          <c:layout/>
           <c:overlay val="0"/>
           <c:spPr>
             <a:noFill/>
@@ -612,7 +605,7 @@
             <a:endParaRPr lang="en-US"/>
           </a:p>
         </c:txPr>
-        <c:crossAx val="-542709312"/>
+        <c:crossAx val="-1049889904"/>
         <c:crosses val="autoZero"/>
         <c:crossBetween val="between"/>
       </c:valAx>
@@ -1337,7 +1330,7 @@
           <a:p>
             <a:fld id="{F368C5AD-71DD-4EC0-A413-C51DC95DD2ED}" type="datetimeFigureOut">
               <a:rPr lang="en-CA" smtClean="0"/>
-              <a:t>2018-07-04</a:t>
+              <a:t>2018-07-08</a:t>
             </a:fld>
             <a:endParaRPr lang="en-CA"/>
           </a:p>
@@ -1889,51 +1882,11 @@
           <a:p>
             <a:r>
               <a:rPr lang="en-CA" dirty="0" smtClean="0"/>
-              <a:t>Our </a:t>
-            </a:r>
-            <a:r>
-              <a:rPr lang="en-CA" dirty="0" smtClean="0"/>
-              <a:t>journaling implementation is a variable-sized redo log with a</a:t>
+              <a:t>Our journaling implementation is a variable-sized redo log with a</a:t>
             </a:r>
             <a:r>
               <a:rPr lang="en-CA" baseline="0" dirty="0" smtClean="0"/>
-              <a:t> novel approach. We place the journal in the free space that is not used by either the old or the new file system </a:t>
-            </a:r>
-            <a:r>
-              <a:rPr lang="en-CA" baseline="0" dirty="0" smtClean="0"/>
-              <a:t>state. </a:t>
-            </a:r>
-            <a:r>
-              <a:rPr lang="en-CA" baseline="0" dirty="0" smtClean="0"/>
-              <a:t>This enables recovery since the space used by the journal would not be overwritten by the new file </a:t>
-            </a:r>
-            <a:r>
-              <a:rPr lang="en-CA" baseline="0" dirty="0" smtClean="0"/>
-              <a:t>system state. </a:t>
-            </a:r>
-            <a:r>
-              <a:rPr lang="en-CA" baseline="0" dirty="0" smtClean="0"/>
-              <a:t>If at any point </a:t>
-            </a:r>
-            <a:r>
-              <a:rPr lang="en-CA" baseline="0" dirty="0" smtClean="0"/>
-              <a:t>we </a:t>
-            </a:r>
-            <a:r>
-              <a:rPr lang="en-CA" baseline="0" dirty="0" smtClean="0"/>
-              <a:t>run out of free space, then we abort </a:t>
-            </a:r>
-            <a:r>
-              <a:rPr lang="en-CA" baseline="0" dirty="0" smtClean="0"/>
-              <a:t>the transaction and </a:t>
-            </a:r>
-            <a:r>
-              <a:rPr lang="en-CA" baseline="0" dirty="0" smtClean="0"/>
-              <a:t>the old file system is left untouched. </a:t>
-            </a:r>
-            <a:r>
-              <a:rPr lang="en-CA" baseline="0" dirty="0" smtClean="0"/>
-              <a:t>This journaling code is written in 1350 lines of code. Now, we will show you the journaling operations and our novel optimization to reduce the total number of blocks journaled.</a:t>
+              <a:t> novel approach. We place the journal in the free space that is not used by either the old or the new file system state. This enables recovery since the space used by the journal would not be overwritten by the new file system state. If at any point we run out of free space, then we abort the transaction and the old file system is left untouched. This journaling code is written in 1350 lines of code. Now, we will show you the journaling operations and our novel optimization to reduce the total number of blocks journaled.</a:t>
             </a:r>
           </a:p>
         </p:txBody>
@@ -2744,11 +2697,7 @@
             </a:r>
             <a:r>
               <a:rPr lang="en-CA" baseline="0" dirty="0" smtClean="0"/>
-              <a:t>. </a:t>
-            </a:r>
-            <a:r>
-              <a:rPr lang="en-CA" baseline="0" dirty="0" smtClean="0"/>
-              <a:t>Currently, our </a:t>
+              <a:t>. Currently, our </a:t>
             </a:r>
             <a:r>
               <a:rPr lang="en-CA" baseline="0" dirty="0" err="1" smtClean="0"/>
@@ -2801,7 +2750,6 @@
               <a:rPr lang="en-CA" baseline="0" dirty="0" smtClean="0"/>
               <a:t> to ext4 will result in a copy of the snapshot being made. </a:t>
             </a:r>
-            <a:endParaRPr lang="en-CA" baseline="0" dirty="0" smtClean="0"/>
           </a:p>
           <a:p>
             <a:pPr marL="0" marR="0" indent="0" algn="l" defTabSz="914400" rtl="0" eaLnBrk="1" fontAlgn="auto" latinLnBrk="0" hangingPunct="1">
@@ -2952,7 +2900,15 @@
             </a:r>
             <a:r>
               <a:rPr lang="en-CA" baseline="0" dirty="0" smtClean="0"/>
-              <a:t> applications are used by system administrators to maintain and optimize their file systems. For example, a defragmentation tool rearranges physical blocks used by files into contiguous extents to optimize read and write performance. A resizing tool helps with changing the size of a file system. A garbage collector helps reclaim space used by stale file system metadata and data, and is critical to the usability of log-structured and copy-on-write file systems. A file-system aware scrubber reduces the overhead of detecting and correcting data corruption. Similarly, a file system upgrade tool can upgrade a file system without reformatting the disk.</a:t>
+              <a:t> applications are used by system administrators to </a:t>
+            </a:r>
+            <a:r>
+              <a:rPr lang="en-CA" baseline="0" dirty="0" smtClean="0"/>
+              <a:t>maintain, optimize, and administer </a:t>
+            </a:r>
+            <a:r>
+              <a:rPr lang="en-CA" baseline="0" dirty="0" smtClean="0"/>
+              <a:t>their file systems. For example, a defragmentation tool rearranges physical blocks used by files into contiguous extents to optimize read and write performance. A resizing tool helps with changing the size of a file system. A garbage collector helps reclaim space used by stale file system metadata and data, and is critical to the usability of log-structured and copy-on-write file systems. A file-system aware scrubber reduces the overhead of detecting and correcting data corruption. Similarly, a file system upgrade tool can upgrade a file system without reformatting the disk.</a:t>
             </a:r>
             <a:endParaRPr lang="en-CA" dirty="0" smtClean="0"/>
           </a:p>
@@ -3121,23 +3077,7 @@
             </a:r>
             <a:r>
               <a:rPr lang="en-CA" baseline="0" dirty="0" smtClean="0"/>
-              <a:t> open the device for reading and writing. On line 1, we open the existing file system as read only. On the next line, we open the same device, except this time as an unformatted device. Next, we start a transaction on the new file system, which activates journaling, and allows the conversion process to be crash consistent in the event of power failures. </a:t>
-            </a:r>
-            <a:r>
-              <a:rPr lang="en-CA" baseline="0" dirty="0" smtClean="0"/>
-              <a:t>On </a:t>
-            </a:r>
-            <a:r>
-              <a:rPr lang="en-CA" baseline="0" dirty="0" smtClean="0"/>
-              <a:t>line 4, we begin the conversion by creating a new file system on disk. Note that since the transaction is journaled, no overwrite of the existing file </a:t>
-            </a:r>
-            <a:r>
-              <a:rPr lang="en-CA" baseline="0" dirty="0" smtClean="0"/>
-              <a:t>system </a:t>
-            </a:r>
-            <a:r>
-              <a:rPr lang="en-CA" baseline="0" dirty="0" smtClean="0"/>
-              <a:t>will occur until the transaction commits. On line 5, we iterate through all </a:t>
+              <a:t> open the device for reading and writing. On line 1, we open the existing file system as read only. On the next line, we open the same device, except this time as an unformatted device. Next, we start a transaction on the new file system, which activates journaling, and allows the conversion process to be crash consistent in the event of power failures. On line 4, we begin the conversion by creating a new file system on disk. Note that since the transaction is journaled, no overwrite of the existing file system will occur until the transaction commits. On line 5, we iterate through all </a:t>
             </a:r>
             <a:r>
               <a:rPr lang="en-CA" baseline="0" dirty="0" err="1" smtClean="0"/>
@@ -3249,15 +3189,7 @@
           <a:p>
             <a:r>
               <a:rPr lang="en-CA" dirty="0" smtClean="0"/>
-              <a:t>process </a:t>
-            </a:r>
-            <a:r>
-              <a:rPr lang="en-CA" dirty="0" smtClean="0"/>
-              <a:t>regular </a:t>
-            </a:r>
-            <a:r>
-              <a:rPr lang="en-CA" dirty="0" smtClean="0"/>
-              <a:t>file can do one of two things when recreating the associated metadata for</a:t>
+              <a:t>process regular file can do one of two things when recreating the associated metadata for</a:t>
             </a:r>
             <a:r>
               <a:rPr lang="en-CA" baseline="0" dirty="0" smtClean="0"/>
@@ -3291,11 +3223,7 @@
             </a:r>
             <a:r>
               <a:rPr lang="en-CA" baseline="0" dirty="0" smtClean="0"/>
-              <a:t> </a:t>
-            </a:r>
-            <a:r>
-              <a:rPr lang="en-CA" baseline="0" dirty="0" smtClean="0"/>
-              <a:t>through all the extents mapped to the </a:t>
+              <a:t> through all the extents mapped to the </a:t>
             </a:r>
             <a:r>
               <a:rPr lang="en-CA" baseline="0" dirty="0" err="1" smtClean="0"/>
@@ -3303,31 +3231,7 @@
             </a:r>
             <a:r>
               <a:rPr lang="en-CA" baseline="0" dirty="0" smtClean="0"/>
-              <a:t> and recreates it on the </a:t>
-            </a:r>
-            <a:r>
-              <a:rPr lang="en-CA" baseline="0" dirty="0" smtClean="0"/>
-              <a:t>destination </a:t>
-            </a:r>
-            <a:r>
-              <a:rPr lang="en-CA" baseline="0" dirty="0" smtClean="0"/>
-              <a:t>file system. It does so by first allocating the extents on the </a:t>
-            </a:r>
-            <a:r>
-              <a:rPr lang="en-CA" baseline="0" dirty="0" smtClean="0"/>
-              <a:t>destination file system without changing the original content, </a:t>
-            </a:r>
-            <a:r>
-              <a:rPr lang="en-CA" baseline="0" dirty="0" smtClean="0"/>
-              <a:t>as shown on line </a:t>
-            </a:r>
-            <a:r>
-              <a:rPr lang="en-CA" baseline="0" dirty="0" smtClean="0"/>
-              <a:t>4, </a:t>
-            </a:r>
-            <a:r>
-              <a:rPr lang="en-CA" baseline="0" dirty="0" smtClean="0"/>
-              <a:t>and then recreate the mapping of each extent to the new </a:t>
+              <a:t> and recreates it on the destination file system. It does so by first allocating the extents on the destination file system without changing the original content, as shown on line 4, and then recreate the mapping of each extent to the new </a:t>
             </a:r>
             <a:r>
               <a:rPr lang="en-CA" baseline="0" dirty="0" err="1" smtClean="0"/>
@@ -3335,15 +3239,7 @@
             </a:r>
             <a:r>
               <a:rPr lang="en-CA" baseline="0" dirty="0" smtClean="0"/>
-              <a:t>, as shown on line </a:t>
-            </a:r>
-            <a:r>
-              <a:rPr lang="en-CA" baseline="0" dirty="0" smtClean="0"/>
-              <a:t>5. </a:t>
-            </a:r>
-            <a:r>
-              <a:rPr lang="en-CA" baseline="0" dirty="0" smtClean="0"/>
-              <a:t>Similar process occurs for recreating directory entries and symbolic links, using the </a:t>
+              <a:t>, as shown on line 5. Similar process occurs for recreating directory entries and symbolic links, using the </a:t>
             </a:r>
             <a:r>
               <a:rPr lang="en-CA" baseline="0" dirty="0" err="1" smtClean="0"/>
@@ -3359,11 +3255,7 @@
             </a:r>
             <a:r>
               <a:rPr lang="en-CA" baseline="0" dirty="0" smtClean="0"/>
-              <a:t> as described earlier. </a:t>
-            </a:r>
-            <a:r>
-              <a:rPr lang="en-CA" baseline="0" dirty="0" smtClean="0"/>
-              <a:t>Next, we’ll discuss our implementation of the journal.</a:t>
+              <a:t> as described earlier. Next, we’ll discuss our implementation of the journal.</a:t>
             </a:r>
             <a:endParaRPr lang="en-CA" dirty="0"/>
           </a:p>
@@ -3455,87 +3347,7 @@
             </a:r>
             <a:r>
               <a:rPr lang="en-CA" baseline="0" dirty="0" smtClean="0"/>
-              <a:t> consistency to the </a:t>
-            </a:r>
-            <a:r>
-              <a:rPr lang="en-CA" baseline="0" dirty="0" smtClean="0"/>
-              <a:t>conversion. </a:t>
-            </a:r>
-            <a:r>
-              <a:rPr lang="en-CA" baseline="0" dirty="0" smtClean="0"/>
-              <a:t>During our evaluation, we find that our journaling implementation has a small overhead of at most 20%, which is a small price to pay considering the danger of data loss during file system conversion. </a:t>
-            </a:r>
-            <a:r>
-              <a:rPr lang="en-CA" baseline="0" dirty="0" smtClean="0"/>
-              <a:t>Coincidentally, </a:t>
-            </a:r>
-            <a:r>
-              <a:rPr lang="en-CA" baseline="0" dirty="0" smtClean="0"/>
-              <a:t>this also reduces the memory overhead of the conversion tool. When journaling is enabled, we are able to read the </a:t>
-            </a:r>
-            <a:r>
-              <a:rPr lang="en-CA" baseline="0" dirty="0" smtClean="0"/>
-              <a:t>source </a:t>
-            </a:r>
-            <a:r>
-              <a:rPr lang="en-CA" baseline="0" dirty="0" smtClean="0"/>
-              <a:t>file system while writing the </a:t>
-            </a:r>
-            <a:r>
-              <a:rPr lang="en-CA" baseline="0" dirty="0" smtClean="0"/>
-              <a:t>destination </a:t>
-            </a:r>
-            <a:r>
-              <a:rPr lang="en-CA" baseline="0" dirty="0" smtClean="0"/>
-              <a:t>file system since before the transaction is committed, the </a:t>
-            </a:r>
-            <a:r>
-              <a:rPr lang="en-CA" baseline="0" dirty="0" smtClean="0"/>
-              <a:t>source </a:t>
-            </a:r>
-            <a:r>
-              <a:rPr lang="en-CA" baseline="0" dirty="0" smtClean="0"/>
-              <a:t>file system is still intact and not overwritten. However, without journaling, the </a:t>
-            </a:r>
-            <a:r>
-              <a:rPr lang="en-CA" baseline="0" dirty="0" smtClean="0"/>
-              <a:t>source </a:t>
-            </a:r>
-            <a:r>
-              <a:rPr lang="en-CA" baseline="0" dirty="0" smtClean="0"/>
-              <a:t>file </a:t>
-            </a:r>
-            <a:r>
-              <a:rPr lang="en-CA" baseline="0" dirty="0" smtClean="0"/>
-              <a:t>system </a:t>
-            </a:r>
-            <a:r>
-              <a:rPr lang="en-CA" baseline="0" dirty="0" smtClean="0"/>
-              <a:t>may be overwritten by the </a:t>
-            </a:r>
-            <a:r>
-              <a:rPr lang="en-CA" baseline="0" dirty="0" smtClean="0"/>
-              <a:t>destination </a:t>
-            </a:r>
-            <a:r>
-              <a:rPr lang="en-CA" baseline="0" dirty="0" smtClean="0"/>
-              <a:t>file system and therefore our previous version of the conversion tool had to read the entire </a:t>
-            </a:r>
-            <a:r>
-              <a:rPr lang="en-CA" baseline="0" dirty="0" smtClean="0"/>
-              <a:t>source </a:t>
-            </a:r>
-            <a:r>
-              <a:rPr lang="en-CA" baseline="0" dirty="0" smtClean="0"/>
-              <a:t>file system metadata into memory before writing out the </a:t>
-            </a:r>
-            <a:r>
-              <a:rPr lang="en-CA" baseline="0" dirty="0" smtClean="0"/>
-              <a:t>destination </a:t>
-            </a:r>
-            <a:r>
-              <a:rPr lang="en-CA" baseline="0" dirty="0" smtClean="0"/>
-              <a:t>file system, which would require excessive an amount of memory for very large file systems.</a:t>
+              <a:t> consistency to the conversion. During our evaluation, we find that our journaling implementation has a small overhead of at most 20%, which is a small price to pay considering the danger of data loss during file system conversion. Coincidentally, this also reduces the memory overhead of the conversion tool. When journaling is enabled, we are able to read the source file system while writing the destination file system since before the transaction is committed, the source file system is still intact and not overwritten. However, without journaling, the source file system may be overwritten by the destination file system and therefore our previous version of the conversion tool had to read the entire source file system metadata into memory before writing out the destination file system, which would require excessive an amount of memory for very large file systems.</a:t>
             </a:r>
             <a:endParaRPr lang="en-CA" dirty="0"/>
           </a:p>
@@ -3635,11 +3447,7 @@
             </a:r>
             <a:r>
               <a:rPr lang="en-CA" baseline="0" dirty="0" smtClean="0"/>
-              <a:t>, making it still </a:t>
-            </a:r>
-            <a:r>
-              <a:rPr lang="en-CA" baseline="0" dirty="0" smtClean="0"/>
-              <a:t>file system specific. Therefore, we arrived at </a:t>
+              <a:t>, making it still file system specific. Therefore, we arrived at </a:t>
             </a:r>
             <a:r>
               <a:rPr lang="en-CA" baseline="0" dirty="0" err="1" smtClean="0"/>
@@ -3927,23 +3735,7 @@
             </a:r>
             <a:r>
               <a:rPr lang="en-CA" baseline="0" dirty="0" smtClean="0"/>
-              <a:t> is for offline use only, which </a:t>
-            </a:r>
-            <a:r>
-              <a:rPr lang="en-CA" baseline="0" dirty="0" smtClean="0"/>
-              <a:t>has exclusive </a:t>
-            </a:r>
-            <a:r>
-              <a:rPr lang="en-CA" baseline="0" dirty="0" smtClean="0"/>
-              <a:t>access to the file </a:t>
-            </a:r>
-            <a:r>
-              <a:rPr lang="en-CA" baseline="0" dirty="0" smtClean="0"/>
-              <a:t>system and does not have to deal with concurrency. </a:t>
-            </a:r>
-            <a:r>
-              <a:rPr lang="en-CA" baseline="0" dirty="0" smtClean="0"/>
-              <a:t>We wish to implement the API for online use, while the file system is mounted and in use by other existing VFS applications. Our goal is to provide transactional support for </a:t>
+              <a:t> is for offline use only, which has exclusive access to the file system and does not have to deal with concurrency. We wish to implement the API for online use, while the file system is mounted and in use by other existing VFS applications. Our goal is to provide transactional support for </a:t>
             </a:r>
             <a:r>
               <a:rPr lang="en-CA" baseline="0" dirty="0" err="1" smtClean="0"/>
@@ -4279,17 +4071,8 @@
             </a:r>
             <a:r>
               <a:rPr lang="en-CA" baseline="0" dirty="0" smtClean="0"/>
-              <a:t>file </a:t>
-            </a:r>
-            <a:r>
-              <a:rPr lang="en-CA" baseline="0" dirty="0" smtClean="0"/>
-              <a:t>into larger, contiguous extents</a:t>
-            </a:r>
-            <a:r>
-              <a:rPr lang="en-CA" baseline="0" dirty="0" smtClean="0"/>
-              <a:t>.</a:t>
-            </a:r>
-            <a:endParaRPr lang="en-CA" baseline="0" dirty="0" smtClean="0"/>
+              <a:t>file into larger, contiguous extents.</a:t>
+            </a:r>
           </a:p>
           <a:p>
             <a:pPr marL="0" marR="0" indent="0" algn="l" defTabSz="914400" rtl="0" eaLnBrk="1" fontAlgn="auto" latinLnBrk="0" hangingPunct="1">
@@ -4777,11 +4560,7 @@
             </a:pPr>
             <a:r>
               <a:rPr lang="en-CA" baseline="0" dirty="0" smtClean="0"/>
-              <a:t>As </a:t>
-            </a:r>
-            <a:r>
-              <a:rPr lang="en-CA" baseline="0" dirty="0" smtClean="0"/>
-              <a:t>we have seen, it is hard to define a generic API based on individual file system structures. Instead, we design an API based on low-level file system abstractions. Our insight is that file system management applications operate on common file system objects, for example, blocks, </a:t>
+              <a:t>As we have seen, it is hard to define a generic API based on individual file system structures. Instead, we design an API based on low-level file system abstractions. Our insight is that file system management applications operate on common file system objects, for example, blocks, </a:t>
             </a:r>
             <a:r>
               <a:rPr lang="en-CA" baseline="0" dirty="0" err="1" smtClean="0"/>
@@ -4928,11 +4707,7 @@
             </a:r>
             <a:r>
               <a:rPr lang="en-CA" baseline="0" dirty="0" smtClean="0"/>
-              <a:t> as splitting the VFS into fine-grained operations</a:t>
-            </a:r>
-            <a:r>
-              <a:rPr lang="en-CA" baseline="0" dirty="0" smtClean="0"/>
-              <a:t>.</a:t>
+              <a:t> as splitting the VFS into fine-grained operations.</a:t>
             </a:r>
           </a:p>
           <a:p>
@@ -5021,15 +4796,7 @@
             </a:r>
             <a:r>
               <a:rPr lang="en-CA" baseline="0" dirty="0" smtClean="0"/>
-              <a:t> also provide support for </a:t>
-            </a:r>
-            <a:r>
-              <a:rPr lang="en-CA" baseline="0" dirty="0" smtClean="0"/>
-              <a:t>iterating through a list of extents that are currently free in the file system. This function allows applications to make smart decisions such as whether to start garbage collection. Last, we support file systems with copy-on-write semantics by </a:t>
-            </a:r>
-            <a:r>
-              <a:rPr lang="en-CA" baseline="0" dirty="0" smtClean="0"/>
-              <a:t>exposing the reverse mapping of an extent to all the </a:t>
+              <a:t> also provide support for iterating through a list of extents that are currently free in the file system. This function allows applications to make smart decisions such as whether to start garbage collection. Last, we support file systems with copy-on-write semantics by exposing the reverse mapping of an extent to all the </a:t>
             </a:r>
             <a:r>
               <a:rPr lang="en-CA" baseline="0" dirty="0" err="1" smtClean="0"/>
@@ -5073,11 +4840,7 @@
             </a:r>
             <a:r>
               <a:rPr lang="en-CA" baseline="0" dirty="0" smtClean="0"/>
-              <a:t> </a:t>
-            </a:r>
-            <a:r>
-              <a:rPr lang="en-CA" baseline="0" dirty="0" smtClean="0"/>
-              <a:t>structures, such as allocating and freeing an </a:t>
+              <a:t> structures, such as allocating and freeing an </a:t>
             </a:r>
             <a:r>
               <a:rPr lang="en-CA" baseline="0" dirty="0" err="1" smtClean="0"/>
@@ -5109,11 +4872,7 @@
             </a:r>
             <a:r>
               <a:rPr lang="en-CA" baseline="0" dirty="0" smtClean="0"/>
-              <a:t>, compressed, or encrypted </a:t>
-            </a:r>
-            <a:r>
-              <a:rPr lang="en-CA" baseline="0" dirty="0" smtClean="0"/>
-              <a:t>data. </a:t>
+              <a:t>, compressed, or encrypted data. </a:t>
             </a:r>
             <a:r>
               <a:rPr lang="en-CA" baseline="0" dirty="0" err="1" smtClean="0"/>
@@ -5129,11 +4888,7 @@
             </a:r>
             <a:r>
               <a:rPr lang="en-CA" baseline="0" dirty="0" smtClean="0"/>
-              <a:t> also support iterating </a:t>
-            </a:r>
-            <a:r>
-              <a:rPr lang="en-CA" baseline="0" dirty="0" smtClean="0"/>
-              <a:t>through all allocated </a:t>
+              <a:t> also support iterating through all allocated </a:t>
             </a:r>
             <a:r>
               <a:rPr lang="en-CA" baseline="0" dirty="0" err="1" smtClean="0"/>
@@ -5283,11 +5038,7 @@
             </a:r>
             <a:r>
               <a:rPr lang="en-CA" dirty="0" smtClean="0"/>
-              <a:t> </a:t>
-            </a:r>
-            <a:r>
-              <a:rPr lang="en-CA" dirty="0" smtClean="0"/>
-              <a:t>also</a:t>
+              <a:t> also</a:t>
             </a:r>
             <a:r>
               <a:rPr lang="en-CA" baseline="0" dirty="0" smtClean="0"/>
@@ -5544,7 +5295,7 @@
           <a:p>
             <a:fld id="{0145D206-3748-4927-8C33-DF34FC1F64AB}" type="datetime1">
               <a:rPr lang="en-CA" smtClean="0"/>
-              <a:t>2018-07-04</a:t>
+              <a:t>2018-07-08</a:t>
             </a:fld>
             <a:endParaRPr lang="en-CA"/>
           </a:p>
@@ -5995,7 +5746,7 @@
           <a:p>
             <a:fld id="{C89DCB4F-0D89-4D46-BA02-4EEC06F0D222}" type="datetime1">
               <a:rPr lang="en-CA" smtClean="0"/>
-              <a:t>2018-07-04</a:t>
+              <a:t>2018-07-08</a:t>
             </a:fld>
             <a:endParaRPr lang="en-CA"/>
           </a:p>
@@ -6245,7 +5996,7 @@
           <a:p>
             <a:fld id="{FC2696F7-A71E-484D-AC3A-CE094204994B}" type="datetime1">
               <a:rPr lang="en-CA" smtClean="0"/>
-              <a:t>2018-07-04</a:t>
+              <a:t>2018-07-08</a:t>
             </a:fld>
             <a:endParaRPr lang="en-CA"/>
           </a:p>
@@ -6553,7 +6304,7 @@
           <a:p>
             <a:fld id="{FF2026A3-D9E4-42EE-8898-5602D67646A6}" type="datetime1">
               <a:rPr lang="en-CA" smtClean="0"/>
-              <a:t>2018-07-04</a:t>
+              <a:t>2018-07-08</a:t>
             </a:fld>
             <a:endParaRPr lang="en-CA"/>
           </a:p>
@@ -6871,7 +6622,7 @@
           <a:p>
             <a:fld id="{382851CE-B33E-4D8E-B913-47C489FB1326}" type="datetime1">
               <a:rPr lang="en-CA" smtClean="0"/>
-              <a:t>2018-07-04</a:t>
+              <a:t>2018-07-08</a:t>
             </a:fld>
             <a:endParaRPr lang="en-CA"/>
           </a:p>
@@ -7173,7 +6924,7 @@
           <a:p>
             <a:fld id="{D0249205-445A-4022-8550-E0423D1698F6}" type="datetime1">
               <a:rPr lang="en-CA" smtClean="0"/>
-              <a:t>2018-07-04</a:t>
+              <a:t>2018-07-08</a:t>
             </a:fld>
             <a:endParaRPr lang="en-CA"/>
           </a:p>
@@ -7540,7 +7291,7 @@
           <a:p>
             <a:fld id="{4928CFC7-231B-411E-A147-D21C0786264A}" type="datetime1">
               <a:rPr lang="en-CA" smtClean="0"/>
-              <a:t>2018-07-04</a:t>
+              <a:t>2018-07-08</a:t>
             </a:fld>
             <a:endParaRPr lang="en-CA"/>
           </a:p>
@@ -7714,7 +7465,7 @@
           <a:p>
             <a:fld id="{EE4A103E-C7C6-4893-8576-55DC8ED846C7}" type="datetime1">
               <a:rPr lang="en-CA" smtClean="0"/>
-              <a:t>2018-07-04</a:t>
+              <a:t>2018-07-08</a:t>
             </a:fld>
             <a:endParaRPr lang="en-CA"/>
           </a:p>
@@ -7894,7 +7645,7 @@
           <a:p>
             <a:fld id="{E79FAEEE-621B-4F9D-B0C9-9282EED4D31D}" type="datetime1">
               <a:rPr lang="en-CA" smtClean="0"/>
-              <a:t>2018-07-04</a:t>
+              <a:t>2018-07-08</a:t>
             </a:fld>
             <a:endParaRPr lang="en-CA"/>
           </a:p>
@@ -8098,7 +7849,7 @@
           <a:p>
             <a:fld id="{D6AD7D9F-39FD-4B95-A4F0-514D658B152C}" type="datetime1">
               <a:rPr lang="en-CA" smtClean="0"/>
-              <a:t>2018-07-04</a:t>
+              <a:t>2018-07-08</a:t>
             </a:fld>
             <a:endParaRPr lang="en-CA"/>
           </a:p>
@@ -8389,7 +8140,7 @@
             <a:fld id="{7D257ED4-7149-4100-B966-397E56D6DA55}" type="datetime1">
               <a:rPr lang="en-CA" smtClean="0"/>
               <a:pPr/>
-              <a:t>2018-07-04</a:t>
+              <a:t>2018-07-08</a:t>
             </a:fld>
             <a:endParaRPr lang="en-CA"/>
           </a:p>
@@ -8832,7 +8583,7 @@
           <a:p>
             <a:fld id="{9ACE3152-893D-476F-92C8-DC87664CFA37}" type="datetime1">
               <a:rPr lang="en-CA" smtClean="0"/>
-              <a:t>2018-07-04</a:t>
+              <a:t>2018-07-08</a:t>
             </a:fld>
             <a:endParaRPr lang="en-CA"/>
           </a:p>
@@ -9214,7 +8965,7 @@
           <a:p>
             <a:fld id="{CB2930E9-C17A-4D90-BAE8-42423BBE919E}" type="datetime1">
               <a:rPr lang="en-CA" smtClean="0"/>
-              <a:t>2018-07-04</a:t>
+              <a:t>2018-07-08</a:t>
             </a:fld>
             <a:endParaRPr lang="en-CA"/>
           </a:p>
@@ -9332,7 +9083,7 @@
           <a:p>
             <a:fld id="{32659AD7-8F94-4BFD-9315-264212F1BDBC}" type="datetime1">
               <a:rPr lang="en-CA" smtClean="0"/>
-              <a:t>2018-07-04</a:t>
+              <a:t>2018-07-08</a:t>
             </a:fld>
             <a:endParaRPr lang="en-CA"/>
           </a:p>
@@ -9427,7 +9178,7 @@
           <a:p>
             <a:fld id="{DA852F67-5290-4349-8ADA-9B77C8B30CA1}" type="datetime1">
               <a:rPr lang="en-CA" smtClean="0"/>
-              <a:t>2018-07-04</a:t>
+              <a:t>2018-07-08</a:t>
             </a:fld>
             <a:endParaRPr lang="en-CA"/>
           </a:p>
@@ -9682,7 +9433,7 @@
           <a:p>
             <a:fld id="{AAA9F9A6-54E7-4285-928E-6A5CE63E658D}" type="datetime1">
               <a:rPr lang="en-CA" smtClean="0"/>
-              <a:t>2018-07-04</a:t>
+              <a:t>2018-07-08</a:t>
             </a:fld>
             <a:endParaRPr lang="en-CA"/>
           </a:p>
@@ -9965,7 +9716,7 @@
           <a:p>
             <a:fld id="{6A9DADFC-E42D-4E18-8E7A-1F87E4DC64CF}" type="datetime1">
               <a:rPr lang="en-CA" smtClean="0"/>
-              <a:t>2018-07-04</a:t>
+              <a:t>2018-07-08</a:t>
             </a:fld>
             <a:endParaRPr lang="en-CA"/>
           </a:p>
@@ -10372,7 +10123,7 @@
           <a:p>
             <a:fld id="{1046A6BF-9417-477F-B83E-822B9F56EF48}" type="datetime1">
               <a:rPr lang="en-CA" smtClean="0"/>
-              <a:t>2018-07-04</a:t>
+              <a:t>2018-07-08</a:t>
             </a:fld>
             <a:endParaRPr lang="en-CA" dirty="0"/>
           </a:p>
@@ -11125,29 +10876,8 @@
             <a:pPr lvl="1"/>
             <a:r>
               <a:rPr lang="en-CA" dirty="0" smtClean="0"/>
-              <a:t>Robust parsing </a:t>
-            </a:r>
-            <a:r>
-              <a:rPr lang="en-CA" dirty="0" smtClean="0"/>
-              <a:t>and serialization </a:t>
-            </a:r>
-            <a:r>
-              <a:rPr lang="en-CA" dirty="0" smtClean="0"/>
-              <a:t>routines</a:t>
-            </a:r>
-            <a:r>
-              <a:rPr lang="en-CA" dirty="0" smtClean="0"/>
-              <a:t> </a:t>
-            </a:r>
-            <a:r>
-              <a:rPr lang="en-CA" dirty="0" smtClean="0"/>
-              <a:t>for </a:t>
-            </a:r>
-            <a:r>
-              <a:rPr lang="en-CA" dirty="0" smtClean="0"/>
-              <a:t>type-safe access</a:t>
-            </a:r>
-            <a:endParaRPr lang="en-CA" dirty="0" smtClean="0"/>
+              <a:t>Robust parsing and serialization routines for type-safe access</a:t>
+            </a:r>
           </a:p>
         </p:txBody>
       </p:sp>
@@ -11203,21 +10933,21 @@
                 <a:gridCol w="1521004">
                   <a:extLst>
                     <a:ext uri="{9D8B030D-6E8A-4147-A177-3AD203B41FA5}">
-                      <a16:colId xmlns:a16="http://schemas.microsoft.com/office/drawing/2014/main" xmlns="" val="20000"/>
+                      <a16:colId xmlns="" xmlns:a16="http://schemas.microsoft.com/office/drawing/2014/main" val="20000"/>
                     </a:ext>
                   </a:extLst>
                 </a:gridCol>
                 <a:gridCol w="2807594">
                   <a:extLst>
                     <a:ext uri="{9D8B030D-6E8A-4147-A177-3AD203B41FA5}">
-                      <a16:colId xmlns:a16="http://schemas.microsoft.com/office/drawing/2014/main" xmlns="" val="20001"/>
+                      <a16:colId xmlns="" xmlns:a16="http://schemas.microsoft.com/office/drawing/2014/main" val="20001"/>
                     </a:ext>
                   </a:extLst>
                 </a:gridCol>
                 <a:gridCol w="2640169">
                   <a:extLst>
                     <a:ext uri="{9D8B030D-6E8A-4147-A177-3AD203B41FA5}">
-                      <a16:colId xmlns:a16="http://schemas.microsoft.com/office/drawing/2014/main" xmlns="" val="20002"/>
+                      <a16:colId xmlns="" xmlns:a16="http://schemas.microsoft.com/office/drawing/2014/main" val="20002"/>
                     </a:ext>
                   </a:extLst>
                 </a:gridCol>
@@ -11342,7 +11072,7 @@
                 </a:tc>
                 <a:extLst>
                   <a:ext uri="{0D108BD9-81ED-4DB2-BD59-A6C34878D82A}">
-                    <a16:rowId xmlns:a16="http://schemas.microsoft.com/office/drawing/2014/main" xmlns="" val="10000"/>
+                    <a16:rowId xmlns="" xmlns:a16="http://schemas.microsoft.com/office/drawing/2014/main" val="10000"/>
                   </a:ext>
                 </a:extLst>
               </a:tr>
@@ -11537,7 +11267,7 @@
                 </a:tc>
                 <a:extLst>
                   <a:ext uri="{0D108BD9-81ED-4DB2-BD59-A6C34878D82A}">
-                    <a16:rowId xmlns:a16="http://schemas.microsoft.com/office/drawing/2014/main" xmlns="" val="10001"/>
+                    <a16:rowId xmlns="" xmlns:a16="http://schemas.microsoft.com/office/drawing/2014/main" val="10001"/>
                   </a:ext>
                 </a:extLst>
               </a:tr>
@@ -11724,7 +11454,7 @@
                 </a:tc>
                 <a:extLst>
                   <a:ext uri="{0D108BD9-81ED-4DB2-BD59-A6C34878D82A}">
-                    <a16:rowId xmlns:a16="http://schemas.microsoft.com/office/drawing/2014/main" xmlns="" val="10002"/>
+                    <a16:rowId xmlns="" xmlns:a16="http://schemas.microsoft.com/office/drawing/2014/main" val="10002"/>
                   </a:ext>
                 </a:extLst>
               </a:tr>
@@ -11911,7 +11641,7 @@
                 </a:tc>
                 <a:extLst>
                   <a:ext uri="{0D108BD9-81ED-4DB2-BD59-A6C34878D82A}">
-                    <a16:rowId xmlns:a16="http://schemas.microsoft.com/office/drawing/2014/main" xmlns="" val="10003"/>
+                    <a16:rowId xmlns="" xmlns:a16="http://schemas.microsoft.com/office/drawing/2014/main" val="10003"/>
                   </a:ext>
                 </a:extLst>
               </a:tr>
@@ -12098,7 +11828,7 @@
                 </a:tc>
                 <a:extLst>
                   <a:ext uri="{0D108BD9-81ED-4DB2-BD59-A6C34878D82A}">
-                    <a16:rowId xmlns:a16="http://schemas.microsoft.com/office/drawing/2014/main" xmlns="" val="10004"/>
+                    <a16:rowId xmlns="" xmlns:a16="http://schemas.microsoft.com/office/drawing/2014/main" val="10004"/>
                   </a:ext>
                 </a:extLst>
               </a:tr>
@@ -12195,7 +11925,11 @@
             <a:pPr lvl="1"/>
             <a:r>
               <a:rPr lang="en-CA" dirty="0" smtClean="0"/>
-              <a:t>Conversion aborts if journal runs out of free space</a:t>
+              <a:t>Transaction </a:t>
+            </a:r>
+            <a:r>
+              <a:rPr lang="en-CA" dirty="0" smtClean="0"/>
+              <a:t>aborts if journal runs out of free space</a:t>
             </a:r>
           </a:p>
           <a:p>
@@ -19023,15 +18757,11 @@
             </a:r>
             <a:r>
               <a:rPr lang="en-CA" dirty="0" smtClean="0"/>
-              <a:t>maintain </a:t>
+              <a:t>maintain, optimize, and administer </a:t>
             </a:r>
             <a:r>
               <a:rPr lang="en-CA" dirty="0" smtClean="0"/>
-              <a:t>and optimize their file </a:t>
-            </a:r>
-            <a:r>
-              <a:rPr lang="en-CA" dirty="0" smtClean="0"/>
-              <a:t>systems</a:t>
+              <a:t>their file systems</a:t>
             </a:r>
           </a:p>
           <a:p>
@@ -19039,7 +18769,6 @@
               <a:rPr lang="en-CA" dirty="0" smtClean="0"/>
               <a:t>Examples</a:t>
             </a:r>
-            <a:endParaRPr lang="en-CA" dirty="0" smtClean="0"/>
           </a:p>
           <a:p>
             <a:pPr lvl="1"/>
@@ -19096,7 +18825,6 @@
               <a:rPr lang="en-CA" dirty="0" smtClean="0"/>
               <a:t>Tool</a:t>
             </a:r>
-            <a:endParaRPr lang="en-CA" dirty="0" smtClean="0"/>
           </a:p>
           <a:p>
             <a:r>
@@ -23235,184 +22963,6 @@
 </p:sld>
 </file>
 
-<file path=ppt/slides/slide29.xml><?xml version="1.0" encoding="utf-8"?>
-<p:sld xmlns:a="http://schemas.openxmlformats.org/drawingml/2006/main" xmlns:r="http://schemas.openxmlformats.org/officeDocument/2006/relationships" xmlns:p="http://schemas.openxmlformats.org/presentationml/2006/main">
-  <p:cSld>
-    <p:spTree>
-      <p:nvGrpSpPr>
-        <p:cNvPr id="1" name=""/>
-        <p:cNvGrpSpPr/>
-        <p:nvPr/>
-      </p:nvGrpSpPr>
-      <p:grpSpPr>
-        <a:xfrm>
-          <a:off x="0" y="0"/>
-          <a:ext cx="0" cy="0"/>
-          <a:chOff x="0" y="0"/>
-          <a:chExt cx="0" cy="0"/>
-        </a:xfrm>
-      </p:grpSpPr>
-      <p:sp>
-        <p:nvSpPr>
-          <p:cNvPr id="2" name="Title 1"/>
-          <p:cNvSpPr>
-            <a:spLocks noGrp="1"/>
-          </p:cNvSpPr>
-          <p:nvPr>
-            <p:ph type="title"/>
-          </p:nvPr>
-        </p:nvSpPr>
-        <p:spPr/>
-        <p:txBody>
-          <a:bodyPr/>
-          <a:lstStyle/>
-          <a:p>
-            <a:r>
-              <a:rPr lang="en-CA" dirty="0" smtClean="0"/>
-              <a:t>Commit Word</a:t>
-            </a:r>
-            <a:endParaRPr lang="en-CA" dirty="0"/>
-          </a:p>
-        </p:txBody>
-      </p:sp>
-      <p:sp>
-        <p:nvSpPr>
-          <p:cNvPr id="4" name="Slide Number Placeholder 3"/>
-          <p:cNvSpPr>
-            <a:spLocks noGrp="1"/>
-          </p:cNvSpPr>
-          <p:nvPr>
-            <p:ph type="sldNum" sz="quarter" idx="12"/>
-          </p:nvPr>
-        </p:nvSpPr>
-        <p:spPr/>
-        <p:txBody>
-          <a:bodyPr/>
-          <a:lstStyle/>
-          <a:p>
-            <a:fld id="{7B2023C8-B124-43A9-8F92-0EEF5BAA9995}" type="slidenum">
-              <a:rPr lang="en-CA" smtClean="0"/>
-              <a:pPr/>
-              <a:t>29</a:t>
-            </a:fld>
-            <a:endParaRPr lang="en-CA" dirty="0"/>
-          </a:p>
-        </p:txBody>
-      </p:sp>
-      <p:sp>
-        <p:nvSpPr>
-          <p:cNvPr id="3" name="Content Placeholder 2"/>
-          <p:cNvSpPr>
-            <a:spLocks noGrp="1"/>
-          </p:cNvSpPr>
-          <p:nvPr>
-            <p:ph idx="1"/>
-          </p:nvPr>
-        </p:nvSpPr>
-        <p:spPr>
-          <a:xfrm>
-            <a:off x="684212" y="1515358"/>
-            <a:ext cx="7824598" cy="4656842"/>
-          </a:xfrm>
-        </p:spPr>
-        <p:txBody>
-          <a:bodyPr/>
-          <a:lstStyle/>
-          <a:p>
-            <a:r>
-              <a:rPr lang="en-CA" dirty="0" smtClean="0"/>
-              <a:t>Purpose</a:t>
-            </a:r>
-          </a:p>
-          <a:p>
-            <a:pPr lvl="1"/>
-            <a:r>
-              <a:rPr lang="en-CA" dirty="0" smtClean="0"/>
-              <a:t>To locate the journal on recovery</a:t>
-            </a:r>
-          </a:p>
-          <a:p>
-            <a:pPr lvl="1"/>
-            <a:r>
-              <a:rPr lang="en-CA" dirty="0" smtClean="0"/>
-              <a:t>Points to first journal descriptor block</a:t>
-            </a:r>
-          </a:p>
-          <a:p>
-            <a:r>
-              <a:rPr lang="en-CA" dirty="0" smtClean="0"/>
-              <a:t>Must be placed at fixed, known location</a:t>
-            </a:r>
-          </a:p>
-          <a:p>
-            <a:pPr lvl="1"/>
-            <a:r>
-              <a:rPr lang="en-CA" dirty="0" smtClean="0"/>
-              <a:t>Currently placed inside the MBR area</a:t>
-            </a:r>
-          </a:p>
-          <a:p>
-            <a:pPr lvl="2"/>
-            <a:r>
-              <a:rPr lang="en-CA" dirty="0" smtClean="0"/>
-              <a:t>Area unused if not boot partition</a:t>
-            </a:r>
-          </a:p>
-          <a:p>
-            <a:r>
-              <a:rPr lang="en-CA" dirty="0" smtClean="0"/>
-              <a:t>Written atomically to disk when transaction commits</a:t>
-            </a:r>
-          </a:p>
-          <a:p>
-            <a:pPr lvl="2"/>
-            <a:endParaRPr lang="en-CA" dirty="0"/>
-          </a:p>
-        </p:txBody>
-      </p:sp>
-      <p:pic>
-        <p:nvPicPr>
-          <p:cNvPr id="6" name="Content Placeholder 10"/>
-          <p:cNvPicPr>
-            <a:picLocks noChangeAspect="1"/>
-          </p:cNvPicPr>
-          <p:nvPr/>
-        </p:nvPicPr>
-        <p:blipFill>
-          <a:blip r:embed="rId2">
-            <a:extLst>
-              <a:ext uri="{28A0092B-C50C-407E-A947-70E740481C1C}">
-                <a14:useLocalDpi xmlns:a14="http://schemas.microsoft.com/office/drawing/2010/main" val="0"/>
-              </a:ext>
-            </a:extLst>
-          </a:blip>
-          <a:stretch>
-            <a:fillRect/>
-          </a:stretch>
-        </p:blipFill>
-        <p:spPr>
-          <a:xfrm>
-            <a:off x="8508809" y="1447640"/>
-            <a:ext cx="2461199" cy="4602005"/>
-          </a:xfrm>
-          <a:prstGeom prst="rect">
-            <a:avLst/>
-          </a:prstGeom>
-        </p:spPr>
-      </p:pic>
-    </p:spTree>
-    <p:extLst>
-      <p:ext uri="{BB962C8B-B14F-4D97-AF65-F5344CB8AC3E}">
-        <p14:creationId xmlns:p14="http://schemas.microsoft.com/office/powerpoint/2010/main" val="1260835470"/>
-      </p:ext>
-    </p:extLst>
-  </p:cSld>
-  <p:clrMapOvr>
-    <a:masterClrMapping/>
-  </p:clrMapOvr>
-</p:sld>
-</file>
-
 <file path=ppt/slides/slide3.xml><?xml version="1.0" encoding="utf-8"?>
 <p:sld xmlns:a="http://schemas.openxmlformats.org/drawingml/2006/main" xmlns:r="http://schemas.openxmlformats.org/officeDocument/2006/relationships" xmlns:p="http://schemas.openxmlformats.org/presentationml/2006/main">
   <p:cSld>
@@ -23489,11 +23039,7 @@
             <a:pPr lvl="1"/>
             <a:r>
               <a:rPr lang="en-CA" dirty="0" smtClean="0"/>
-              <a:t>E.g., a defragmentation tool moves extents of a fragmented </a:t>
-            </a:r>
-            <a:r>
-              <a:rPr lang="en-CA" dirty="0" smtClean="0"/>
-              <a:t>file</a:t>
+              <a:t>E.g., a defragmentation tool moves extents of a fragmented file</a:t>
             </a:r>
             <a:endParaRPr lang="en-CA" dirty="0"/>
           </a:p>
@@ -23576,493 +23122,6 @@
 </p:sld>
 </file>
 
-<file path=ppt/slides/slide30.xml><?xml version="1.0" encoding="utf-8"?>
-<p:sld xmlns:a="http://schemas.openxmlformats.org/drawingml/2006/main" xmlns:r="http://schemas.openxmlformats.org/officeDocument/2006/relationships" xmlns:p="http://schemas.openxmlformats.org/presentationml/2006/main">
-  <p:cSld>
-    <p:spTree>
-      <p:nvGrpSpPr>
-        <p:cNvPr id="1" name=""/>
-        <p:cNvGrpSpPr/>
-        <p:nvPr/>
-      </p:nvGrpSpPr>
-      <p:grpSpPr>
-        <a:xfrm>
-          <a:off x="0" y="0"/>
-          <a:ext cx="0" cy="0"/>
-          <a:chOff x="0" y="0"/>
-          <a:chExt cx="0" cy="0"/>
-        </a:xfrm>
-      </p:grpSpPr>
-      <p:sp>
-        <p:nvSpPr>
-          <p:cNvPr id="2" name="Title 1"/>
-          <p:cNvSpPr>
-            <a:spLocks noGrp="1"/>
-          </p:cNvSpPr>
-          <p:nvPr>
-            <p:ph type="title"/>
-          </p:nvPr>
-        </p:nvSpPr>
-        <p:spPr/>
-        <p:txBody>
-          <a:bodyPr/>
-          <a:lstStyle/>
-          <a:p>
-            <a:r>
-              <a:rPr lang="en-CA" dirty="0" smtClean="0"/>
-              <a:t>1. Write to Free Space</a:t>
-            </a:r>
-            <a:endParaRPr lang="en-CA" dirty="0"/>
-          </a:p>
-        </p:txBody>
-      </p:sp>
-      <p:sp>
-        <p:nvSpPr>
-          <p:cNvPr id="4" name="Slide Number Placeholder 3"/>
-          <p:cNvSpPr>
-            <a:spLocks noGrp="1"/>
-          </p:cNvSpPr>
-          <p:nvPr>
-            <p:ph type="sldNum" sz="quarter" idx="12"/>
-          </p:nvPr>
-        </p:nvSpPr>
-        <p:spPr/>
-        <p:txBody>
-          <a:bodyPr/>
-          <a:lstStyle/>
-          <a:p>
-            <a:fld id="{7B2023C8-B124-43A9-8F92-0EEF5BAA9995}" type="slidenum">
-              <a:rPr lang="en-CA" smtClean="0"/>
-              <a:pPr/>
-              <a:t>30</a:t>
-            </a:fld>
-            <a:endParaRPr lang="en-CA" dirty="0"/>
-          </a:p>
-        </p:txBody>
-      </p:sp>
-      <p:sp>
-        <p:nvSpPr>
-          <p:cNvPr id="3" name="Content Placeholder 2"/>
-          <p:cNvSpPr>
-            <a:spLocks noGrp="1"/>
-          </p:cNvSpPr>
-          <p:nvPr>
-            <p:ph idx="1"/>
-          </p:nvPr>
-        </p:nvSpPr>
-        <p:spPr>
-          <a:xfrm>
-            <a:off x="684212" y="1515358"/>
-            <a:ext cx="5909771" cy="4656842"/>
-          </a:xfrm>
-        </p:spPr>
-        <p:txBody>
-          <a:bodyPr/>
-          <a:lstStyle/>
-          <a:p>
-            <a:r>
-              <a:rPr lang="en-CA" dirty="0" smtClean="0"/>
-              <a:t>If write to free space, skip journaling</a:t>
-            </a:r>
-          </a:p>
-          <a:p>
-            <a:r>
-              <a:rPr lang="en-CA" dirty="0" smtClean="0"/>
-              <a:t>OK because no overwrite occurs</a:t>
-            </a:r>
-          </a:p>
-          <a:p>
-            <a:r>
-              <a:rPr lang="en-CA" dirty="0" smtClean="0"/>
-              <a:t>Journaling layer must </a:t>
-            </a:r>
-            <a:r>
-              <a:rPr lang="en-CA" dirty="0" err="1" smtClean="0"/>
-              <a:t>upcall</a:t>
-            </a:r>
-            <a:r>
-              <a:rPr lang="en-CA" dirty="0" smtClean="0"/>
-              <a:t> to the file system to know which blocks are free</a:t>
-            </a:r>
-          </a:p>
-          <a:p>
-            <a:r>
-              <a:rPr lang="en-CA" dirty="0" err="1" smtClean="0"/>
-              <a:t>eVFS</a:t>
-            </a:r>
-            <a:r>
-              <a:rPr lang="en-CA" dirty="0" smtClean="0"/>
-              <a:t> provides API for querying allocation status of blocks</a:t>
-            </a:r>
-            <a:endParaRPr lang="en-CA" dirty="0"/>
-          </a:p>
-        </p:txBody>
-      </p:sp>
-      <p:pic>
-        <p:nvPicPr>
-          <p:cNvPr id="6" name="Content Placeholder 4"/>
-          <p:cNvPicPr>
-            <a:picLocks noChangeAspect="1"/>
-          </p:cNvPicPr>
-          <p:nvPr/>
-        </p:nvPicPr>
-        <p:blipFill>
-          <a:blip r:embed="rId2">
-            <a:extLst>
-              <a:ext uri="{28A0092B-C50C-407E-A947-70E740481C1C}">
-                <a14:useLocalDpi xmlns:a14="http://schemas.microsoft.com/office/drawing/2010/main" val="0"/>
-              </a:ext>
-            </a:extLst>
-          </a:blip>
-          <a:stretch>
-            <a:fillRect/>
-          </a:stretch>
-        </p:blipFill>
-        <p:spPr>
-          <a:xfrm>
-            <a:off x="6774288" y="1515358"/>
-            <a:ext cx="4195721" cy="2636127"/>
-          </a:xfrm>
-          <a:prstGeom prst="rect">
-            <a:avLst/>
-          </a:prstGeom>
-        </p:spPr>
-      </p:pic>
-    </p:spTree>
-    <p:extLst>
-      <p:ext uri="{BB962C8B-B14F-4D97-AF65-F5344CB8AC3E}">
-        <p14:creationId xmlns:p14="http://schemas.microsoft.com/office/powerpoint/2010/main" val="2821319683"/>
-      </p:ext>
-    </p:extLst>
-  </p:cSld>
-  <p:clrMapOvr>
-    <a:masterClrMapping/>
-  </p:clrMapOvr>
-</p:sld>
-</file>
-
-<file path=ppt/slides/slide31.xml><?xml version="1.0" encoding="utf-8"?>
-<p:sld xmlns:a="http://schemas.openxmlformats.org/drawingml/2006/main" xmlns:r="http://schemas.openxmlformats.org/officeDocument/2006/relationships" xmlns:p="http://schemas.openxmlformats.org/presentationml/2006/main">
-  <p:cSld>
-    <p:spTree>
-      <p:nvGrpSpPr>
-        <p:cNvPr id="1" name=""/>
-        <p:cNvGrpSpPr/>
-        <p:nvPr/>
-      </p:nvGrpSpPr>
-      <p:grpSpPr>
-        <a:xfrm>
-          <a:off x="0" y="0"/>
-          <a:ext cx="0" cy="0"/>
-          <a:chOff x="0" y="0"/>
-          <a:chExt cx="0" cy="0"/>
-        </a:xfrm>
-      </p:grpSpPr>
-      <p:sp>
-        <p:nvSpPr>
-          <p:cNvPr id="2" name="Title 1"/>
-          <p:cNvSpPr>
-            <a:spLocks noGrp="1"/>
-          </p:cNvSpPr>
-          <p:nvPr>
-            <p:ph type="title"/>
-          </p:nvPr>
-        </p:nvSpPr>
-        <p:spPr/>
-        <p:txBody>
-          <a:bodyPr/>
-          <a:lstStyle/>
-          <a:p>
-            <a:r>
-              <a:rPr lang="en-CA" dirty="0" smtClean="0"/>
-              <a:t>2. Write to Allocated Space</a:t>
-            </a:r>
-            <a:endParaRPr lang="en-CA" dirty="0"/>
-          </a:p>
-        </p:txBody>
-      </p:sp>
-      <p:sp>
-        <p:nvSpPr>
-          <p:cNvPr id="4" name="Slide Number Placeholder 3"/>
-          <p:cNvSpPr>
-            <a:spLocks noGrp="1"/>
-          </p:cNvSpPr>
-          <p:nvPr>
-            <p:ph type="sldNum" sz="quarter" idx="12"/>
-          </p:nvPr>
-        </p:nvSpPr>
-        <p:spPr/>
-        <p:txBody>
-          <a:bodyPr/>
-          <a:lstStyle/>
-          <a:p>
-            <a:fld id="{7B2023C8-B124-43A9-8F92-0EEF5BAA9995}" type="slidenum">
-              <a:rPr lang="en-CA" smtClean="0"/>
-              <a:pPr/>
-              <a:t>31</a:t>
-            </a:fld>
-            <a:endParaRPr lang="en-CA" dirty="0"/>
-          </a:p>
-        </p:txBody>
-      </p:sp>
-      <p:sp>
-        <p:nvSpPr>
-          <p:cNvPr id="3" name="Content Placeholder 2"/>
-          <p:cNvSpPr>
-            <a:spLocks noGrp="1"/>
-          </p:cNvSpPr>
-          <p:nvPr>
-            <p:ph idx="1"/>
-          </p:nvPr>
-        </p:nvSpPr>
-        <p:spPr>
-          <a:xfrm>
-            <a:off x="684212" y="1515358"/>
-            <a:ext cx="5909771" cy="4656842"/>
-          </a:xfrm>
-        </p:spPr>
-        <p:txBody>
-          <a:bodyPr/>
-          <a:lstStyle/>
-          <a:p>
-            <a:r>
-              <a:rPr lang="en-CA" dirty="0" smtClean="0"/>
-              <a:t>If overwrite of source file system will occur, the block must first be journaled</a:t>
-            </a:r>
-          </a:p>
-          <a:p>
-            <a:r>
-              <a:rPr lang="en-CA" dirty="0" smtClean="0"/>
-              <a:t>After commit, journal blocks are </a:t>
-            </a:r>
-            <a:r>
-              <a:rPr lang="en-CA" dirty="0" err="1" smtClean="0"/>
-              <a:t>checkpointed</a:t>
-            </a:r>
-            <a:r>
-              <a:rPr lang="en-CA" dirty="0" smtClean="0"/>
-              <a:t> to their final location</a:t>
-            </a:r>
-          </a:p>
-          <a:p>
-            <a:r>
-              <a:rPr lang="en-CA" dirty="0" err="1" smtClean="0"/>
-              <a:t>Checkpointing</a:t>
-            </a:r>
-            <a:r>
-              <a:rPr lang="en-CA" dirty="0" smtClean="0"/>
-              <a:t> can be restarted upon power failure</a:t>
-            </a:r>
-          </a:p>
-          <a:p>
-            <a:pPr lvl="1"/>
-            <a:r>
-              <a:rPr lang="en-CA" dirty="0" smtClean="0"/>
-              <a:t>Ensures failure atomicity</a:t>
-            </a:r>
-            <a:endParaRPr lang="en-CA" dirty="0"/>
-          </a:p>
-        </p:txBody>
-      </p:sp>
-      <p:pic>
-        <p:nvPicPr>
-          <p:cNvPr id="6" name="Content Placeholder 4"/>
-          <p:cNvPicPr>
-            <a:picLocks noChangeAspect="1"/>
-          </p:cNvPicPr>
-          <p:nvPr/>
-        </p:nvPicPr>
-        <p:blipFill>
-          <a:blip r:embed="rId2">
-            <a:extLst>
-              <a:ext uri="{28A0092B-C50C-407E-A947-70E740481C1C}">
-                <a14:useLocalDpi xmlns:a14="http://schemas.microsoft.com/office/drawing/2010/main" val="0"/>
-              </a:ext>
-            </a:extLst>
-          </a:blip>
-          <a:stretch>
-            <a:fillRect/>
-          </a:stretch>
-        </p:blipFill>
-        <p:spPr>
-          <a:xfrm>
-            <a:off x="6772408" y="1507237"/>
-            <a:ext cx="4197600" cy="2899658"/>
-          </a:xfrm>
-          <a:prstGeom prst="rect">
-            <a:avLst/>
-          </a:prstGeom>
-        </p:spPr>
-      </p:pic>
-    </p:spTree>
-    <p:extLst>
-      <p:ext uri="{BB962C8B-B14F-4D97-AF65-F5344CB8AC3E}">
-        <p14:creationId xmlns:p14="http://schemas.microsoft.com/office/powerpoint/2010/main" val="417192487"/>
-      </p:ext>
-    </p:extLst>
-  </p:cSld>
-  <p:clrMapOvr>
-    <a:masterClrMapping/>
-  </p:clrMapOvr>
-</p:sld>
-</file>
-
-<file path=ppt/slides/slide32.xml><?xml version="1.0" encoding="utf-8"?>
-<p:sld xmlns:a="http://schemas.openxmlformats.org/drawingml/2006/main" xmlns:r="http://schemas.openxmlformats.org/officeDocument/2006/relationships" xmlns:p="http://schemas.openxmlformats.org/presentationml/2006/main">
-  <p:cSld>
-    <p:spTree>
-      <p:nvGrpSpPr>
-        <p:cNvPr id="1" name=""/>
-        <p:cNvGrpSpPr/>
-        <p:nvPr/>
-      </p:nvGrpSpPr>
-      <p:grpSpPr>
-        <a:xfrm>
-          <a:off x="0" y="0"/>
-          <a:ext cx="0" cy="0"/>
-          <a:chOff x="0" y="0"/>
-          <a:chExt cx="0" cy="0"/>
-        </a:xfrm>
-      </p:grpSpPr>
-      <p:sp>
-        <p:nvSpPr>
-          <p:cNvPr id="2" name="Title 1"/>
-          <p:cNvSpPr>
-            <a:spLocks noGrp="1"/>
-          </p:cNvSpPr>
-          <p:nvPr>
-            <p:ph type="title"/>
-          </p:nvPr>
-        </p:nvSpPr>
-        <p:spPr/>
-        <p:txBody>
-          <a:bodyPr/>
-          <a:lstStyle/>
-          <a:p>
-            <a:r>
-              <a:rPr lang="en-CA" dirty="0" smtClean="0"/>
-              <a:t>3. Write to Journal</a:t>
-            </a:r>
-            <a:endParaRPr lang="en-CA" dirty="0"/>
-          </a:p>
-        </p:txBody>
-      </p:sp>
-      <p:sp>
-        <p:nvSpPr>
-          <p:cNvPr id="4" name="Slide Number Placeholder 3"/>
-          <p:cNvSpPr>
-            <a:spLocks noGrp="1"/>
-          </p:cNvSpPr>
-          <p:nvPr>
-            <p:ph type="sldNum" sz="quarter" idx="12"/>
-          </p:nvPr>
-        </p:nvSpPr>
-        <p:spPr/>
-        <p:txBody>
-          <a:bodyPr/>
-          <a:lstStyle/>
-          <a:p>
-            <a:fld id="{7B2023C8-B124-43A9-8F92-0EEF5BAA9995}" type="slidenum">
-              <a:rPr lang="en-CA" smtClean="0"/>
-              <a:pPr/>
-              <a:t>32</a:t>
-            </a:fld>
-            <a:endParaRPr lang="en-CA" dirty="0"/>
-          </a:p>
-        </p:txBody>
-      </p:sp>
-      <p:sp>
-        <p:nvSpPr>
-          <p:cNvPr id="3" name="Content Placeholder 2"/>
-          <p:cNvSpPr>
-            <a:spLocks noGrp="1"/>
-          </p:cNvSpPr>
-          <p:nvPr>
-            <p:ph idx="1"/>
-          </p:nvPr>
-        </p:nvSpPr>
-        <p:spPr>
-          <a:xfrm>
-            <a:off x="684212" y="1515358"/>
-            <a:ext cx="6088196" cy="4656842"/>
-          </a:xfrm>
-        </p:spPr>
-        <p:txBody>
-          <a:bodyPr/>
-          <a:lstStyle/>
-          <a:p>
-            <a:r>
-              <a:rPr lang="en-US" dirty="0" smtClean="0"/>
-              <a:t>Must remap journal blocks to new free space before writing data</a:t>
-            </a:r>
-          </a:p>
-          <a:p>
-            <a:r>
-              <a:rPr lang="en-CA" dirty="0" smtClean="0"/>
-              <a:t>Journaling not necessary because not overwriting allocated space</a:t>
-            </a:r>
-          </a:p>
-          <a:p>
-            <a:pPr lvl="1"/>
-            <a:r>
-              <a:rPr lang="en-CA" dirty="0" smtClean="0"/>
-              <a:t>i.e. journal area </a:t>
-            </a:r>
-            <a:r>
-              <a:rPr lang="en-CA" b="1" dirty="0" smtClean="0"/>
-              <a:t>NOT</a:t>
-            </a:r>
-            <a:r>
-              <a:rPr lang="en-CA" dirty="0" smtClean="0"/>
-              <a:t> considered allocated to the file system</a:t>
-            </a:r>
-            <a:endParaRPr lang="en-CA" dirty="0"/>
-          </a:p>
-        </p:txBody>
-      </p:sp>
-      <p:pic>
-        <p:nvPicPr>
-          <p:cNvPr id="6" name="Content Placeholder 4"/>
-          <p:cNvPicPr>
-            <a:picLocks noChangeAspect="1"/>
-          </p:cNvPicPr>
-          <p:nvPr/>
-        </p:nvPicPr>
-        <p:blipFill>
-          <a:blip r:embed="rId2">
-            <a:extLst>
-              <a:ext uri="{28A0092B-C50C-407E-A947-70E740481C1C}">
-                <a14:useLocalDpi xmlns:a14="http://schemas.microsoft.com/office/drawing/2010/main" val="0"/>
-              </a:ext>
-            </a:extLst>
-          </a:blip>
-          <a:stretch>
-            <a:fillRect/>
-          </a:stretch>
-        </p:blipFill>
-        <p:spPr>
-          <a:xfrm>
-            <a:off x="6772408" y="1515358"/>
-            <a:ext cx="4197600" cy="2913466"/>
-          </a:xfrm>
-          <a:prstGeom prst="rect">
-            <a:avLst/>
-          </a:prstGeom>
-        </p:spPr>
-      </p:pic>
-    </p:spTree>
-    <p:extLst>
-      <p:ext uri="{BB962C8B-B14F-4D97-AF65-F5344CB8AC3E}">
-        <p14:creationId xmlns:p14="http://schemas.microsoft.com/office/powerpoint/2010/main" val="42845020"/>
-      </p:ext>
-    </p:extLst>
-  </p:cSld>
-  <p:clrMapOvr>
-    <a:masterClrMapping/>
-  </p:clrMapOvr>
-</p:sld>
-</file>
-
 <file path=ppt/slides/slide4.xml><?xml version="1.0" encoding="utf-8"?>
 <p:sld xmlns:a="http://schemas.openxmlformats.org/drawingml/2006/main" xmlns:r="http://schemas.openxmlformats.org/officeDocument/2006/relationships" xmlns:p="http://schemas.openxmlformats.org/presentationml/2006/main">
   <p:cSld>
@@ -24144,11 +23203,7 @@
             <a:pPr lvl="1"/>
             <a:r>
               <a:rPr lang="en-CA" dirty="0" smtClean="0"/>
-              <a:t>E.g., a defragmentation tool moves extents of a fragmented </a:t>
-            </a:r>
-            <a:r>
-              <a:rPr lang="en-CA" dirty="0" smtClean="0"/>
-              <a:t>file</a:t>
+              <a:t>E.g., a defragmentation tool moves extents of a fragmented file</a:t>
             </a:r>
             <a:endParaRPr lang="en-CA" dirty="0"/>
           </a:p>
@@ -27037,15 +26092,7 @@
                   <a:schemeClr val="bg1"/>
                 </a:solidFill>
               </a:rPr>
-              <a:t> </a:t>
-            </a:r>
-            <a:r>
-              <a:rPr lang="en-CA" b="1" dirty="0" smtClean="0">
-                <a:solidFill>
-                  <a:schemeClr val="bg1"/>
-                </a:solidFill>
-              </a:rPr>
-              <a:t>File System</a:t>
+              <a:t> File System</a:t>
             </a:r>
             <a:endParaRPr lang="en-CA" b="1" dirty="0">
               <a:solidFill>
@@ -27151,11 +26198,7 @@
             <a:pPr lvl="1"/>
             <a:r>
               <a:rPr lang="en-CA" dirty="0" smtClean="0"/>
-              <a:t>E.g., a defragmentation tool moves extents of a fragmented </a:t>
-            </a:r>
-            <a:r>
-              <a:rPr lang="en-CA" dirty="0" smtClean="0"/>
-              <a:t>file</a:t>
+              <a:t>E.g., a defragmentation tool moves extents of a fragmented file</a:t>
             </a:r>
             <a:endParaRPr lang="en-CA" dirty="0"/>
           </a:p>
@@ -27725,21 +26768,21 @@
                 <a:gridCol w="1376407">
                   <a:extLst>
                     <a:ext uri="{9D8B030D-6E8A-4147-A177-3AD203B41FA5}">
-                      <a16:colId xmlns:a16="http://schemas.microsoft.com/office/drawing/2014/main" xmlns="" val="20000"/>
+                      <a16:colId xmlns="" xmlns:a16="http://schemas.microsoft.com/office/drawing/2014/main" val="20000"/>
                     </a:ext>
                   </a:extLst>
                 </a:gridCol>
                 <a:gridCol w="3388710">
                   <a:extLst>
                     <a:ext uri="{9D8B030D-6E8A-4147-A177-3AD203B41FA5}">
-                      <a16:colId xmlns:a16="http://schemas.microsoft.com/office/drawing/2014/main" xmlns="" val="20001"/>
+                      <a16:colId xmlns="" xmlns:a16="http://schemas.microsoft.com/office/drawing/2014/main" val="20001"/>
                     </a:ext>
                   </a:extLst>
                 </a:gridCol>
                 <a:gridCol w="5226908">
                   <a:extLst>
                     <a:ext uri="{9D8B030D-6E8A-4147-A177-3AD203B41FA5}">
-                      <a16:colId xmlns:a16="http://schemas.microsoft.com/office/drawing/2014/main" xmlns="" val="20002"/>
+                      <a16:colId xmlns="" xmlns:a16="http://schemas.microsoft.com/office/drawing/2014/main" val="20002"/>
                     </a:ext>
                   </a:extLst>
                 </a:gridCol>
@@ -27924,7 +26967,7 @@
                 </a:tc>
                 <a:extLst>
                   <a:ext uri="{0D108BD9-81ED-4DB2-BD59-A6C34878D82A}">
-                    <a16:rowId xmlns:a16="http://schemas.microsoft.com/office/drawing/2014/main" xmlns="" val="10000"/>
+                    <a16:rowId xmlns="" xmlns:a16="http://schemas.microsoft.com/office/drawing/2014/main" val="10000"/>
                   </a:ext>
                 </a:extLst>
               </a:tr>
@@ -28534,7 +27577,7 @@
                 </a:tc>
                 <a:extLst>
                   <a:ext uri="{0D108BD9-81ED-4DB2-BD59-A6C34878D82A}">
-                    <a16:rowId xmlns:a16="http://schemas.microsoft.com/office/drawing/2014/main" xmlns="" val="10001"/>
+                    <a16:rowId xmlns="" xmlns:a16="http://schemas.microsoft.com/office/drawing/2014/main" val="10001"/>
                   </a:ext>
                 </a:extLst>
               </a:tr>
@@ -28694,7 +27737,7 @@
                 </a:tc>
                 <a:extLst>
                   <a:ext uri="{0D108BD9-81ED-4DB2-BD59-A6C34878D82A}">
-                    <a16:rowId xmlns:a16="http://schemas.microsoft.com/office/drawing/2014/main" xmlns="" val="10002"/>
+                    <a16:rowId xmlns="" xmlns:a16="http://schemas.microsoft.com/office/drawing/2014/main" val="10002"/>
                   </a:ext>
                 </a:extLst>
               </a:tr>
@@ -28829,7 +27872,7 @@
                 </a:tc>
                 <a:extLst>
                   <a:ext uri="{0D108BD9-81ED-4DB2-BD59-A6C34878D82A}">
-                    <a16:rowId xmlns:a16="http://schemas.microsoft.com/office/drawing/2014/main" xmlns="" val="10003"/>
+                    <a16:rowId xmlns="" xmlns:a16="http://schemas.microsoft.com/office/drawing/2014/main" val="10003"/>
                   </a:ext>
                 </a:extLst>
               </a:tr>
@@ -29029,7 +28072,7 @@
                 </a:tc>
                 <a:extLst>
                   <a:ext uri="{0D108BD9-81ED-4DB2-BD59-A6C34878D82A}">
-                    <a16:rowId xmlns:a16="http://schemas.microsoft.com/office/drawing/2014/main" xmlns="" val="10004"/>
+                    <a16:rowId xmlns="" xmlns:a16="http://schemas.microsoft.com/office/drawing/2014/main" val="10004"/>
                   </a:ext>
                 </a:extLst>
               </a:tr>
@@ -29262,7 +28305,7 @@
                 </a:tc>
                 <a:extLst>
                   <a:ext uri="{0D108BD9-81ED-4DB2-BD59-A6C34878D82A}">
-                    <a16:rowId xmlns:a16="http://schemas.microsoft.com/office/drawing/2014/main" xmlns="" val="10005"/>
+                    <a16:rowId xmlns="" xmlns:a16="http://schemas.microsoft.com/office/drawing/2014/main" val="10005"/>
                   </a:ext>
                 </a:extLst>
               </a:tr>
@@ -29429,7 +28472,7 @@
                 </a:tc>
                 <a:extLst>
                   <a:ext uri="{0D108BD9-81ED-4DB2-BD59-A6C34878D82A}">
-                    <a16:rowId xmlns:a16="http://schemas.microsoft.com/office/drawing/2014/main" xmlns="" val="10006"/>
+                    <a16:rowId xmlns="" xmlns:a16="http://schemas.microsoft.com/office/drawing/2014/main" val="10006"/>
                   </a:ext>
                 </a:extLst>
               </a:tr>
@@ -29572,7 +28615,7 @@
                 </a:tc>
                 <a:extLst>
                   <a:ext uri="{0D108BD9-81ED-4DB2-BD59-A6C34878D82A}">
-                    <a16:rowId xmlns:a16="http://schemas.microsoft.com/office/drawing/2014/main" xmlns="" val="10007"/>
+                    <a16:rowId xmlns="" xmlns:a16="http://schemas.microsoft.com/office/drawing/2014/main" val="10007"/>
                   </a:ext>
                 </a:extLst>
               </a:tr>
@@ -29740,7 +28783,7 @@
                 </a:tc>
                 <a:extLst>
                   <a:ext uri="{0D108BD9-81ED-4DB2-BD59-A6C34878D82A}">
-                    <a16:rowId xmlns:a16="http://schemas.microsoft.com/office/drawing/2014/main" xmlns="" val="10008"/>
+                    <a16:rowId xmlns="" xmlns:a16="http://schemas.microsoft.com/office/drawing/2014/main" val="10008"/>
                   </a:ext>
                 </a:extLst>
               </a:tr>
@@ -29825,7 +28868,6 @@
               <a:rPr lang="en-CA" dirty="0"/>
               <a:t> Operations</a:t>
             </a:r>
-            <a:endParaRPr lang="en-CA" dirty="0"/>
           </a:p>
         </p:txBody>
       </p:sp>
@@ -29858,11 +28900,7 @@
             <a:pPr lvl="1"/>
             <a:r>
               <a:rPr lang="en-CA" dirty="0" smtClean="0"/>
-              <a:t>Protects </a:t>
-            </a:r>
-            <a:r>
-              <a:rPr lang="en-CA" dirty="0" smtClean="0"/>
-              <a:t>file system from corruption and data loss</a:t>
+              <a:t>Protects file system from corruption and data loss</a:t>
             </a:r>
           </a:p>
           <a:p>
@@ -29875,7 +28913,6 @@
               <a:rPr lang="en-CA" dirty="0" smtClean="0"/>
               <a:t>applications</a:t>
             </a:r>
-            <a:endParaRPr lang="en-CA" dirty="0" smtClean="0"/>
           </a:p>
         </p:txBody>
       </p:sp>
@@ -29931,21 +28968,21 @@
                 <a:gridCol w="1651214">
                   <a:extLst>
                     <a:ext uri="{9D8B030D-6E8A-4147-A177-3AD203B41FA5}">
-                      <a16:colId xmlns:a16="http://schemas.microsoft.com/office/drawing/2014/main" xmlns="" val="20000"/>
+                      <a16:colId xmlns="" xmlns:a16="http://schemas.microsoft.com/office/drawing/2014/main" val="20000"/>
                     </a:ext>
                   </a:extLst>
                 </a:gridCol>
                 <a:gridCol w="2545492">
                   <a:extLst>
                     <a:ext uri="{9D8B030D-6E8A-4147-A177-3AD203B41FA5}">
-                      <a16:colId xmlns:a16="http://schemas.microsoft.com/office/drawing/2014/main" xmlns="" val="20001"/>
+                      <a16:colId xmlns="" xmlns:a16="http://schemas.microsoft.com/office/drawing/2014/main" val="20001"/>
                     </a:ext>
                   </a:extLst>
                 </a:gridCol>
                 <a:gridCol w="5436973">
                   <a:extLst>
                     <a:ext uri="{9D8B030D-6E8A-4147-A177-3AD203B41FA5}">
-                      <a16:colId xmlns:a16="http://schemas.microsoft.com/office/drawing/2014/main" xmlns="" val="20002"/>
+                      <a16:colId xmlns="" xmlns:a16="http://schemas.microsoft.com/office/drawing/2014/main" val="20002"/>
                     </a:ext>
                   </a:extLst>
                 </a:gridCol>
@@ -30130,7 +29167,7 @@
                 </a:tc>
                 <a:extLst>
                   <a:ext uri="{0D108BD9-81ED-4DB2-BD59-A6C34878D82A}">
-                    <a16:rowId xmlns:a16="http://schemas.microsoft.com/office/drawing/2014/main" xmlns="" val="10000"/>
+                    <a16:rowId xmlns="" xmlns:a16="http://schemas.microsoft.com/office/drawing/2014/main" val="10000"/>
                   </a:ext>
                 </a:extLst>
               </a:tr>
@@ -30264,15 +29301,7 @@
                             <a:sysClr val="windowText" lastClr="000000"/>
                           </a:solidFill>
                         </a:rPr>
-                        <a:t>Add </a:t>
-                      </a:r>
-                      <a:r>
-                        <a:rPr lang="en-CA" sz="2000" dirty="0" smtClean="0">
-                          <a:solidFill>
-                            <a:sysClr val="windowText" lastClr="000000"/>
-                          </a:solidFill>
-                        </a:rPr>
-                        <a:t>an</a:t>
+                        <a:t>Add an</a:t>
                       </a:r>
                       <a:r>
                         <a:rPr lang="en-CA" sz="2000" baseline="0" dirty="0" smtClean="0">
@@ -30296,15 +29325,7 @@
                             <a:sysClr val="windowText" lastClr="000000"/>
                           </a:solidFill>
                         </a:rPr>
-                        <a:t> </a:t>
-                      </a:r>
-                      <a:r>
-                        <a:rPr lang="en-CA" sz="2000" baseline="0" dirty="0" smtClean="0">
-                          <a:solidFill>
-                            <a:sysClr val="windowText" lastClr="000000"/>
-                          </a:solidFill>
-                        </a:rPr>
-                        <a:t>to a directory </a:t>
+                        <a:t> to a directory </a:t>
                       </a:r>
                       <a:r>
                         <a:rPr lang="en-CA" sz="2000" baseline="0" dirty="0" err="1" smtClean="0">
@@ -30362,7 +29383,7 @@
                 </a:tc>
                 <a:extLst>
                   <a:ext uri="{0D108BD9-81ED-4DB2-BD59-A6C34878D82A}">
-                    <a16:rowId xmlns:a16="http://schemas.microsoft.com/office/drawing/2014/main" xmlns="" val="10009"/>
+                    <a16:rowId xmlns="" xmlns:a16="http://schemas.microsoft.com/office/drawing/2014/main" val="10009"/>
                   </a:ext>
                 </a:extLst>
               </a:tr>
@@ -30684,7 +29705,7 @@
                 </a:tc>
                 <a:extLst>
                   <a:ext uri="{0D108BD9-81ED-4DB2-BD59-A6C34878D82A}">
-                    <a16:rowId xmlns:a16="http://schemas.microsoft.com/office/drawing/2014/main" xmlns="" val="10010"/>
+                    <a16:rowId xmlns="" xmlns:a16="http://schemas.microsoft.com/office/drawing/2014/main" val="10010"/>
                   </a:ext>
                 </a:extLst>
               </a:tr>

</xml_diff>

<commit_message>
addressed ashvin's latest comments
</commit_message>
<xml_diff>
--- a/slide/evfs_talk.pptx
+++ b/slide/evfs_talk.pptx
@@ -394,11 +394,11 @@
         </c:dLbls>
         <c:marker val="1"/>
         <c:smooth val="0"/>
-        <c:axId val="-1049889904"/>
-        <c:axId val="-1049882832"/>
+        <c:axId val="328672328"/>
+        <c:axId val="328669976"/>
       </c:lineChart>
       <c:catAx>
-        <c:axId val="-1049889904"/>
+        <c:axId val="328672328"/>
         <c:scaling>
           <c:orientation val="minMax"/>
         </c:scaling>
@@ -499,7 +499,7 @@
             <a:endParaRPr lang="en-US"/>
           </a:p>
         </c:txPr>
-        <c:crossAx val="-1049882832"/>
+        <c:crossAx val="328669976"/>
         <c:crosses val="autoZero"/>
         <c:auto val="0"/>
         <c:lblAlgn val="ctr"/>
@@ -507,7 +507,7 @@
         <c:noMultiLvlLbl val="0"/>
       </c:catAx>
       <c:valAx>
-        <c:axId val="-1049882832"/>
+        <c:axId val="328669976"/>
         <c:scaling>
           <c:logBase val="4"/>
           <c:orientation val="minMax"/>
@@ -550,7 +550,6 @@
               </a:p>
             </c:rich>
           </c:tx>
-          <c:layout/>
           <c:overlay val="0"/>
           <c:spPr>
             <a:noFill/>
@@ -605,7 +604,7 @@
             <a:endParaRPr lang="en-US"/>
           </a:p>
         </c:txPr>
-        <c:crossAx val="-1049889904"/>
+        <c:crossAx val="328672328"/>
         <c:crosses val="autoZero"/>
         <c:crossBetween val="between"/>
       </c:valAx>
@@ -1330,7 +1329,7 @@
           <a:p>
             <a:fld id="{F368C5AD-71DD-4EC0-A413-C51DC95DD2ED}" type="datetimeFigureOut">
               <a:rPr lang="en-CA" smtClean="0"/>
-              <a:t>2018-07-08</a:t>
+              <a:t>2018-07-09</a:t>
             </a:fld>
             <a:endParaRPr lang="en-CA"/>
           </a:p>
@@ -2900,15 +2899,7 @@
             </a:r>
             <a:r>
               <a:rPr lang="en-CA" baseline="0" dirty="0" smtClean="0"/>
-              <a:t> applications are used by system administrators to </a:t>
-            </a:r>
-            <a:r>
-              <a:rPr lang="en-CA" baseline="0" dirty="0" smtClean="0"/>
-              <a:t>maintain, optimize, and administer </a:t>
-            </a:r>
-            <a:r>
-              <a:rPr lang="en-CA" baseline="0" dirty="0" smtClean="0"/>
-              <a:t>their file systems. For example, a defragmentation tool rearranges physical blocks used by files into contiguous extents to optimize read and write performance. A resizing tool helps with changing the size of a file system. A garbage collector helps reclaim space used by stale file system metadata and data, and is critical to the usability of log-structured and copy-on-write file systems. A file-system aware scrubber reduces the overhead of detecting and correcting data corruption. Similarly, a file system upgrade tool can upgrade a file system without reformatting the disk.</a:t>
+              <a:t> applications are used by system administrators to maintain, optimize, and administer their file systems. For example, a defragmentation tool rearranges physical blocks used by files into contiguous extents to optimize read and write performance. A resizing tool helps with changing the size of a file system. A garbage collector helps reclaim space used by stale file system metadata and data, and is critical to the usability of log-structured and copy-on-write file systems. A file-system aware scrubber reduces the overhead of detecting and correcting data corruption. Similarly, a file system upgrade tool can upgrade a file system without reformatting the disk.</a:t>
             </a:r>
             <a:endParaRPr lang="en-CA" dirty="0" smtClean="0"/>
           </a:p>
@@ -3255,7 +3246,11 @@
             </a:r>
             <a:r>
               <a:rPr lang="en-CA" baseline="0" dirty="0" smtClean="0"/>
-              <a:t> as described earlier. Next, we’ll discuss our implementation of the journal.</a:t>
+              <a:t> as described earlier. Next, we’ll discuss </a:t>
+            </a:r>
+            <a:r>
+              <a:rPr lang="en-CA" baseline="0" dirty="0" smtClean="0"/>
+              <a:t>how journaling reduces the memory overhead of the conversion tool.</a:t>
             </a:r>
             <a:endParaRPr lang="en-CA" dirty="0"/>
           </a:p>
@@ -3342,12 +3337,44 @@
           <a:lstStyle/>
           <a:p>
             <a:r>
-              <a:rPr lang="en-CA" dirty="0" smtClean="0"/>
-              <a:t>Journaling provides crash</a:t>
+              <a:rPr lang="en-CA" sz="1200" b="0" i="0" kern="1200" dirty="0" smtClean="0">
+                <a:solidFill>
+                  <a:schemeClr val="tx1"/>
+                </a:solidFill>
+                <a:effectLst/>
+                <a:latin typeface="+mn-lt"/>
+                <a:ea typeface="+mn-ea"/>
+                <a:cs typeface="+mn-cs"/>
+              </a:rPr>
+              <a:t>Journaling provides crash consistency during the conversion process. </a:t>
             </a:r>
             <a:r>
               <a:rPr lang="en-CA" baseline="0" dirty="0" smtClean="0"/>
-              <a:t> consistency to the conversion. During our evaluation, we find that our journaling implementation has a small overhead of at most 20%, which is a small price to pay considering the danger of data loss during file system conversion. Coincidentally, this also reduces the memory overhead of the conversion tool. When journaling is enabled, we are able to read the source file system while writing the destination file system since before the transaction is committed, the source file system is still intact and not overwritten. However, without journaling, the source file system may be overwritten by the destination file system and therefore our previous version of the conversion tool had to read the entire source file system metadata into memory before writing out the destination file system, which would require excessive an amount of memory for very large file systems.</a:t>
+              <a:t>During </a:t>
+            </a:r>
+            <a:r>
+              <a:rPr lang="en-CA" baseline="0" dirty="0" smtClean="0"/>
+              <a:t>our evaluation, we find that our journaling implementation has a small overhead of at most 20%, which is a small price to pay considering the danger of data loss during file system conversion. </a:t>
+            </a:r>
+            <a:r>
+              <a:rPr lang="en-CA" sz="1200" b="0" i="0" kern="1200" dirty="0" smtClean="0">
+                <a:solidFill>
+                  <a:schemeClr val="tx1"/>
+                </a:solidFill>
+                <a:effectLst/>
+                <a:latin typeface="+mn-lt"/>
+                <a:ea typeface="+mn-ea"/>
+                <a:cs typeface="+mn-cs"/>
+              </a:rPr>
+              <a:t>Coincidentally, the journal-based implementation </a:t>
+            </a:r>
+            <a:r>
+              <a:rPr lang="en-CA" baseline="0" dirty="0" smtClean="0"/>
+              <a:t>also </a:t>
+            </a:r>
+            <a:r>
+              <a:rPr lang="en-CA" baseline="0" dirty="0" smtClean="0"/>
+              <a:t>reduces the memory overhead of the conversion tool. When journaling is enabled, we are able to read the source file system while writing the destination file system since before the transaction is committed, the source file system is still intact and not overwritten. However, without journaling, the source file system may be overwritten by the destination file system and therefore our previous version of the conversion tool had to read the entire source file system metadata into memory before writing out the destination file system, which would require excessive an amount of memory for very large file systems.</a:t>
             </a:r>
             <a:endParaRPr lang="en-CA" dirty="0"/>
           </a:p>
@@ -3439,7 +3466,38 @@
             </a:r>
             <a:r>
               <a:rPr lang="en-CA" baseline="0" dirty="0" smtClean="0"/>
-              <a:t> discuss the main take away of our work in terms of design trade offs. On the leftmost side in this diagram, we have VFS, which provides the most generic API and is able to support all file systems. However, it provides the least control, and thus can only work for applications that operate at the file level. On the other side, manual-written applications are file system specific and provides full control to the programmer at the cost of complexity and lack of generality. In between, we have Spiffy, which provides type-safe access to data structures and simplifies traversal of the file system tree. However, it only knows about the types of data structures but not the semantics, such as the meaning of an </a:t>
+              <a:t> discuss the main take away of our work in terms of design trade offs. On the leftmost side in this diagram, we have VFS, which provides the most generic API and is able to support all file systems. However, it provides the least control, and thus can only work for applications that operate at the file level. </a:t>
+            </a:r>
+            <a:endParaRPr lang="en-CA" baseline="0" dirty="0" smtClean="0"/>
+          </a:p>
+          <a:p>
+            <a:r>
+              <a:rPr lang="en-CA" sz="1200" b="0" i="0" kern="1200" dirty="0" smtClean="0">
+                <a:solidFill>
+                  <a:schemeClr val="tx1"/>
+                </a:solidFill>
+                <a:effectLst/>
+                <a:latin typeface="+mn-lt"/>
+                <a:ea typeface="+mn-ea"/>
+                <a:cs typeface="+mn-cs"/>
+              </a:rPr>
+              <a:t>On the other side, manually-written file-system management applications </a:t>
+            </a:r>
+            <a:r>
+              <a:rPr lang="en-CA" baseline="0" dirty="0" smtClean="0"/>
+              <a:t>are </a:t>
+            </a:r>
+            <a:r>
+              <a:rPr lang="en-CA" baseline="0" dirty="0" smtClean="0"/>
+              <a:t>file system specific and provides full control to the programmer at the cost of complexity and lack of generality. In between, we have Spiffy, which provides type-safe access to data structures </a:t>
+            </a:r>
+            <a:r>
+              <a:rPr lang="en-CA" baseline="0" dirty="0" smtClean="0"/>
+              <a:t>and it </a:t>
+            </a:r>
+            <a:r>
+              <a:rPr lang="en-CA" baseline="0" dirty="0" smtClean="0"/>
+              <a:t>simplifies traversal of the file system tree. However, it only knows about the types of data structures but not the semantics, such as the meaning of an </a:t>
             </a:r>
             <a:r>
               <a:rPr lang="en-CA" baseline="0" dirty="0" err="1" smtClean="0"/>
@@ -3624,11 +3682,7 @@
             </a:r>
             <a:r>
               <a:rPr lang="en-CA" baseline="0" dirty="0" smtClean="0"/>
-              <a:t> also does not support RAID and volume managers, since its interface does not expose </a:t>
-            </a:r>
-            <a:r>
-              <a:rPr lang="en-CA" baseline="0" smtClean="0"/>
-              <a:t>such feature.</a:t>
+              <a:t> also does not support RAID and volume managers, since its interface does not expose such feature.</a:t>
             </a:r>
             <a:endParaRPr lang="en-CA" dirty="0" smtClean="0"/>
           </a:p>
@@ -3847,6 +3901,138 @@
           <a:p>
             <a:r>
               <a:rPr lang="en-CA" dirty="0" smtClean="0"/>
+              <a:t>In conclusion, we have designed</a:t>
+            </a:r>
+            <a:r>
+              <a:rPr lang="en-CA" baseline="0" dirty="0" smtClean="0"/>
+              <a:t> and implemented the </a:t>
+            </a:r>
+            <a:r>
+              <a:rPr lang="en-CA" baseline="0" dirty="0" err="1" smtClean="0"/>
+              <a:t>evfs</a:t>
+            </a:r>
+            <a:r>
+              <a:rPr lang="en-CA" baseline="0" dirty="0" smtClean="0"/>
+              <a:t> </a:t>
+            </a:r>
+            <a:r>
+              <a:rPr lang="en-CA" baseline="0" dirty="0" err="1" smtClean="0"/>
+              <a:t>api</a:t>
+            </a:r>
+            <a:r>
+              <a:rPr lang="en-CA" baseline="0" dirty="0" smtClean="0"/>
+              <a:t>. The </a:t>
+            </a:r>
+            <a:r>
+              <a:rPr lang="en-CA" baseline="0" dirty="0" err="1" smtClean="0"/>
+              <a:t>evfs</a:t>
+            </a:r>
+            <a:r>
+              <a:rPr lang="en-CA" baseline="0" dirty="0" smtClean="0"/>
+              <a:t> API operates on abstract file system objects and supports fine-grained operations on these objects. It enables file system management applications to be written generically, and just once, and be able to work for all file systems that implements the </a:t>
+            </a:r>
+            <a:r>
+              <a:rPr lang="en-CA" baseline="0" dirty="0" err="1" smtClean="0"/>
+              <a:t>evfs</a:t>
+            </a:r>
+            <a:r>
+              <a:rPr lang="en-CA" baseline="0" dirty="0" smtClean="0"/>
+              <a:t> </a:t>
+            </a:r>
+            <a:r>
+              <a:rPr lang="en-CA" baseline="0" dirty="0" err="1" smtClean="0"/>
+              <a:t>api</a:t>
+            </a:r>
+            <a:r>
+              <a:rPr lang="en-CA" baseline="0" smtClean="0"/>
+              <a:t>.</a:t>
+            </a:r>
+            <a:endParaRPr lang="en-CA" dirty="0"/>
+          </a:p>
+        </p:txBody>
+      </p:sp>
+      <p:sp>
+        <p:nvSpPr>
+          <p:cNvPr id="4" name="Slide Number Placeholder 3"/>
+          <p:cNvSpPr>
+            <a:spLocks noGrp="1"/>
+          </p:cNvSpPr>
+          <p:nvPr>
+            <p:ph type="sldNum" sz="quarter" idx="10"/>
+          </p:nvPr>
+        </p:nvSpPr>
+        <p:spPr/>
+        <p:txBody>
+          <a:bodyPr/>
+          <a:lstStyle/>
+          <a:p>
+            <a:fld id="{B5B5BF96-4013-477F-9949-176AD53AFF60}" type="slidenum">
+              <a:rPr lang="en-CA" smtClean="0"/>
+              <a:t>26</a:t>
+            </a:fld>
+            <a:endParaRPr lang="en-CA"/>
+          </a:p>
+        </p:txBody>
+      </p:sp>
+    </p:spTree>
+    <p:extLst>
+      <p:ext uri="{BB962C8B-B14F-4D97-AF65-F5344CB8AC3E}">
+        <p14:creationId xmlns:p14="http://schemas.microsoft.com/office/powerpoint/2010/main" val="4196742748"/>
+      </p:ext>
+    </p:extLst>
+  </p:cSld>
+  <p:clrMapOvr>
+    <a:masterClrMapping/>
+  </p:clrMapOvr>
+</p:notes>
+</file>
+
+<file path=ppt/notesSlides/notesSlide27.xml><?xml version="1.0" encoding="utf-8"?>
+<p:notes xmlns:a="http://schemas.openxmlformats.org/drawingml/2006/main" xmlns:r="http://schemas.openxmlformats.org/officeDocument/2006/relationships" xmlns:p="http://schemas.openxmlformats.org/presentationml/2006/main">
+  <p:cSld>
+    <p:spTree>
+      <p:nvGrpSpPr>
+        <p:cNvPr id="1" name=""/>
+        <p:cNvGrpSpPr/>
+        <p:nvPr/>
+      </p:nvGrpSpPr>
+      <p:grpSpPr>
+        <a:xfrm>
+          <a:off x="0" y="0"/>
+          <a:ext cx="0" cy="0"/>
+          <a:chOff x="0" y="0"/>
+          <a:chExt cx="0" cy="0"/>
+        </a:xfrm>
+      </p:grpSpPr>
+      <p:sp>
+        <p:nvSpPr>
+          <p:cNvPr id="2" name="Slide Image Placeholder 1"/>
+          <p:cNvSpPr>
+            <a:spLocks noGrp="1" noRot="1" noChangeAspect="1"/>
+          </p:cNvSpPr>
+          <p:nvPr>
+            <p:ph type="sldImg"/>
+          </p:nvPr>
+        </p:nvSpPr>
+        <p:spPr/>
+      </p:sp>
+      <p:sp>
+        <p:nvSpPr>
+          <p:cNvPr id="3" name="Notes Placeholder 2"/>
+          <p:cNvSpPr>
+            <a:spLocks noGrp="1"/>
+          </p:cNvSpPr>
+          <p:nvPr>
+            <p:ph type="body" idx="1"/>
+          </p:nvPr>
+        </p:nvSpPr>
+        <p:spPr/>
+        <p:txBody>
+          <a:bodyPr/>
+          <a:lstStyle/>
+          <a:p>
+            <a:r>
+              <a:rPr lang="en-CA" dirty="0" smtClean="0"/>
               <a:t>Thank you, are</a:t>
             </a:r>
             <a:r>
@@ -3893,7 +4079,7 @@
 </p:notes>
 </file>
 
-<file path=ppt/notesSlides/notesSlide27.xml><?xml version="1.0" encoding="utf-8"?>
+<file path=ppt/notesSlides/notesSlide28.xml><?xml version="1.0" encoding="utf-8"?>
 <p:notes xmlns:a="http://schemas.openxmlformats.org/drawingml/2006/main" xmlns:r="http://schemas.openxmlformats.org/officeDocument/2006/relationships" xmlns:p="http://schemas.openxmlformats.org/presentationml/2006/main">
   <p:cSld>
     <p:spTree>
@@ -4711,20 +4897,49 @@
             </a:r>
           </a:p>
           <a:p>
-            <a:endParaRPr lang="en-CA" baseline="0" dirty="0" smtClean="0"/>
-          </a:p>
-          <a:p>
+            <a:r>
+              <a:rPr lang="en-CA" sz="1200" b="0" i="0" kern="1200" dirty="0" smtClean="0">
+                <a:solidFill>
+                  <a:schemeClr val="tx1"/>
+                </a:solidFill>
+                <a:effectLst/>
+                <a:latin typeface="+mn-lt"/>
+                <a:ea typeface="+mn-ea"/>
+                <a:cs typeface="+mn-cs"/>
+              </a:rPr>
+              <a:t>The EVFS API operates on four types of objects, the global file system, extents, </a:t>
+            </a:r>
+            <a:r>
+              <a:rPr lang="en-CA" sz="1200" b="0" i="0" kern="1200" dirty="0" err="1" smtClean="0">
+                <a:solidFill>
+                  <a:schemeClr val="tx1"/>
+                </a:solidFill>
+                <a:effectLst/>
+                <a:latin typeface="+mn-lt"/>
+                <a:ea typeface="+mn-ea"/>
+                <a:cs typeface="+mn-cs"/>
+              </a:rPr>
+              <a:t>inodes</a:t>
+            </a:r>
+            <a:r>
+              <a:rPr lang="en-CA" sz="1200" b="0" i="0" kern="1200" dirty="0" smtClean="0">
+                <a:solidFill>
+                  <a:schemeClr val="tx1"/>
+                </a:solidFill>
+                <a:effectLst/>
+                <a:latin typeface="+mn-lt"/>
+                <a:ea typeface="+mn-ea"/>
+                <a:cs typeface="+mn-cs"/>
+              </a:rPr>
+              <a:t>, and directories. The global file system operations  provide</a:t>
+            </a:r>
             <a:r>
               <a:rPr lang="en-CA" baseline="0" dirty="0" smtClean="0"/>
-              <a:t>As a first step, </a:t>
-            </a:r>
-            <a:r>
-              <a:rPr lang="en-CA" baseline="0" dirty="0" err="1" smtClean="0"/>
-              <a:t>evfs</a:t>
+              <a:t> </a:t>
             </a:r>
             <a:r>
               <a:rPr lang="en-CA" baseline="0" dirty="0" smtClean="0"/>
-              <a:t> provides the ability to make a new file system on a device, or update the settings of an existing file system, such as changing the label or toggling file system features. </a:t>
+              <a:t>the ability to make a new file system on a device, or update the settings of an existing file system, such as changing the label or toggling file system features. </a:t>
             </a:r>
             <a:endParaRPr lang="en-CA" dirty="0" smtClean="0"/>
           </a:p>
@@ -4746,7 +4961,22 @@
               <a:tabLst/>
               <a:defRPr/>
             </a:pPr>
-            <a:endParaRPr lang="en-CA" dirty="0" smtClean="0"/>
+            <a:r>
+              <a:rPr lang="en-CA" dirty="0" smtClean="0"/>
+              <a:t>Many </a:t>
+            </a:r>
+            <a:r>
+              <a:rPr lang="en-CA" dirty="0" smtClean="0"/>
+              <a:t>file system</a:t>
+            </a:r>
+            <a:r>
+              <a:rPr lang="en-CA" baseline="0" dirty="0" smtClean="0"/>
+              <a:t> management tools require the ability to control the physical layout of the data blocks on disk, for example, defragmentation tools and garbage collectors need to move data blocks from one physical location to another</a:t>
+            </a:r>
+            <a:r>
+              <a:rPr lang="en-CA" baseline="0" dirty="0" smtClean="0"/>
+              <a:t>.</a:t>
+            </a:r>
           </a:p>
           <a:p>
             <a:pPr marL="0" marR="0" lvl="0" indent="0" algn="l" defTabSz="914400" rtl="0" eaLnBrk="1" fontAlgn="auto" latinLnBrk="0" hangingPunct="1">
@@ -4767,20 +4997,48 @@
               <a:defRPr/>
             </a:pPr>
             <a:r>
-              <a:rPr lang="en-CA" dirty="0" smtClean="0"/>
-              <a:t>Many file system</a:t>
-            </a:r>
-            <a:r>
               <a:rPr lang="en-CA" baseline="0" dirty="0" smtClean="0"/>
-              <a:t> management tools require the ability to control the physical layout of the data blocks on disk, for example, defragmentation tools and garbage collectors need to move data blocks from one physical location to another. As such, </a:t>
-            </a:r>
-            <a:r>
-              <a:rPr lang="en-CA" baseline="0" dirty="0" err="1" smtClean="0"/>
-              <a:t>evfs</a:t>
+              <a:t>As such, </a:t>
+            </a:r>
+            <a:r>
+              <a:rPr lang="en-CA" sz="1200" b="0" i="0" kern="1200" dirty="0" smtClean="0">
+                <a:solidFill>
+                  <a:schemeClr val="tx1"/>
+                </a:solidFill>
+                <a:effectLst/>
+                <a:latin typeface="+mn-lt"/>
+                <a:ea typeface="+mn-ea"/>
+                <a:cs typeface="+mn-cs"/>
+              </a:rPr>
+              <a:t>The EVFS API provides several fine-grained operations for managing extents such as allocating and freeing extents. </a:t>
+            </a:r>
+            <a:r>
+              <a:rPr lang="en-CA" sz="1200" b="0" i="0" kern="1200" dirty="0" err="1" smtClean="0">
+                <a:solidFill>
+                  <a:schemeClr val="tx1"/>
+                </a:solidFill>
+                <a:effectLst/>
+                <a:latin typeface="+mn-lt"/>
+                <a:ea typeface="+mn-ea"/>
+                <a:cs typeface="+mn-cs"/>
+              </a:rPr>
+              <a:t>Evfs</a:t>
+            </a:r>
+            <a:r>
+              <a:rPr lang="en-CA" sz="1200" b="0" i="0" kern="1200" dirty="0" smtClean="0">
+                <a:solidFill>
+                  <a:schemeClr val="tx1"/>
+                </a:solidFill>
+                <a:effectLst/>
+                <a:latin typeface="+mn-lt"/>
+                <a:ea typeface="+mn-ea"/>
+                <a:cs typeface="+mn-cs"/>
+              </a:rPr>
+              <a:t> also provides support for iterating </a:t>
             </a:r>
             <a:r>
               <a:rPr lang="en-CA" baseline="0" dirty="0" smtClean="0"/>
-              <a:t> provides fine-grained API for managing extents. First, we support the basic operation of allocating and freeing extents. Next, we support iterating through a list of extents mapped to an </a:t>
+              <a:t>through a list of extents mapped to an </a:t>
             </a:r>
             <a:r>
               <a:rPr lang="en-CA" baseline="0" dirty="0" err="1" smtClean="0"/>
@@ -4796,17 +5054,68 @@
             </a:r>
             <a:r>
               <a:rPr lang="en-CA" baseline="0" dirty="0" smtClean="0"/>
-              <a:t> also provide support for iterating through a list of extents that are currently free in the file system. This function allows applications to make smart decisions such as whether to start garbage collection. Last, we support file systems with copy-on-write semantics by exposing the reverse mapping of an extent to all the </a:t>
-            </a:r>
-            <a:r>
-              <a:rPr lang="en-CA" baseline="0" dirty="0" err="1" smtClean="0"/>
+              <a:t> also provide support for iterating through a list of extents that are currently free in the file system. This function allows applications to make smart decisions such as whether to start garbage collection. </a:t>
+            </a:r>
+            <a:r>
+              <a:rPr lang="en-CA" sz="1200" b="0" i="0" kern="1200" dirty="0" smtClean="0">
+                <a:solidFill>
+                  <a:schemeClr val="tx1"/>
+                </a:solidFill>
+                <a:effectLst/>
+                <a:latin typeface="+mn-lt"/>
+                <a:ea typeface="+mn-ea"/>
+                <a:cs typeface="+mn-cs"/>
+              </a:rPr>
+              <a:t>Last, we support file systems with copy-on-write semantics by providing the </a:t>
+            </a:r>
+            <a:r>
+              <a:rPr lang="en-CA" sz="1200" b="0" i="0" kern="1200" dirty="0" err="1" smtClean="0">
+                <a:solidFill>
+                  <a:schemeClr val="tx1"/>
+                </a:solidFill>
+                <a:effectLst/>
+                <a:latin typeface="+mn-lt"/>
+                <a:ea typeface="+mn-ea"/>
+                <a:cs typeface="+mn-cs"/>
+              </a:rPr>
+              <a:t>extent_reverse</a:t>
+            </a:r>
+            <a:r>
+              <a:rPr lang="en-CA" sz="1200" b="0" i="0" kern="1200" dirty="0" smtClean="0">
+                <a:solidFill>
+                  <a:schemeClr val="tx1"/>
+                </a:solidFill>
+                <a:effectLst/>
+                <a:latin typeface="+mn-lt"/>
+                <a:ea typeface="+mn-ea"/>
+                <a:cs typeface="+mn-cs"/>
+              </a:rPr>
+              <a:t> API function that returns all </a:t>
+            </a:r>
+            <a:r>
+              <a:rPr lang="en-CA" sz="1200" b="0" i="0" kern="1200" dirty="0" err="1" smtClean="0">
+                <a:solidFill>
+                  <a:schemeClr val="tx1"/>
+                </a:solidFill>
+                <a:effectLst/>
+                <a:latin typeface="+mn-lt"/>
+                <a:ea typeface="+mn-ea"/>
+                <a:cs typeface="+mn-cs"/>
+              </a:rPr>
               <a:t>inodes</a:t>
             </a:r>
             <a:r>
-              <a:rPr lang="en-CA" baseline="0" dirty="0" smtClean="0"/>
-              <a:t> that references it.</a:t>
-            </a:r>
-            <a:endParaRPr lang="en-CA" dirty="0" smtClean="0"/>
+              <a:rPr lang="en-CA" sz="1200" b="0" i="0" kern="1200" dirty="0" smtClean="0">
+                <a:solidFill>
+                  <a:schemeClr val="tx1"/>
+                </a:solidFill>
+                <a:effectLst/>
+                <a:latin typeface="+mn-lt"/>
+                <a:ea typeface="+mn-ea"/>
+                <a:cs typeface="+mn-cs"/>
+              </a:rPr>
+              <a:t> that map to an extent.</a:t>
+            </a:r>
           </a:p>
           <a:p>
             <a:pPr marL="0" marR="0" lvl="0" indent="0" algn="l" defTabSz="914400" rtl="0" eaLnBrk="1" fontAlgn="auto" latinLnBrk="0" hangingPunct="1">
@@ -4828,11 +5137,23 @@
             </a:pPr>
             <a:r>
               <a:rPr lang="en-CA" dirty="0" smtClean="0"/>
-              <a:t>Similarly, there are operations which</a:t>
+              <a:t>Similarly</a:t>
+            </a:r>
+            <a:r>
+              <a:rPr lang="en-CA" dirty="0" smtClean="0"/>
+              <a:t>, there are operations which</a:t>
             </a:r>
             <a:r>
               <a:rPr lang="en-CA" baseline="0" dirty="0" smtClean="0"/>
-              <a:t> works with </a:t>
+              <a:t> </a:t>
+            </a:r>
+            <a:r>
+              <a:rPr lang="en-CA" baseline="0" dirty="0" smtClean="0"/>
+              <a:t>work </a:t>
+            </a:r>
+            <a:r>
+              <a:rPr lang="en-CA" baseline="0" dirty="0" smtClean="0"/>
+              <a:t>with </a:t>
             </a:r>
             <a:r>
               <a:rPr lang="en-CA" baseline="0" dirty="0" err="1" smtClean="0"/>
@@ -4864,7 +5185,15 @@
             </a:r>
             <a:r>
               <a:rPr lang="en-CA" baseline="0" dirty="0" smtClean="0"/>
-              <a:t> write provides the same functionality as VFS read and write, and are necessary for reading from or writing to </a:t>
+              <a:t> write </a:t>
+            </a:r>
+            <a:r>
+              <a:rPr lang="en-CA" baseline="0" dirty="0" smtClean="0"/>
+              <a:t>provide </a:t>
+            </a:r>
+            <a:r>
+              <a:rPr lang="en-CA" baseline="0" dirty="0" smtClean="0"/>
+              <a:t>the same functionality as VFS read and write, and are necessary for reading from or writing to </a:t>
             </a:r>
             <a:r>
               <a:rPr lang="en-CA" baseline="0" dirty="0" err="1" smtClean="0"/>
@@ -5295,7 +5624,7 @@
           <a:p>
             <a:fld id="{0145D206-3748-4927-8C33-DF34FC1F64AB}" type="datetime1">
               <a:rPr lang="en-CA" smtClean="0"/>
-              <a:t>2018-07-08</a:t>
+              <a:t>2018-07-09</a:t>
             </a:fld>
             <a:endParaRPr lang="en-CA"/>
           </a:p>
@@ -5746,7 +6075,7 @@
           <a:p>
             <a:fld id="{C89DCB4F-0D89-4D46-BA02-4EEC06F0D222}" type="datetime1">
               <a:rPr lang="en-CA" smtClean="0"/>
-              <a:t>2018-07-08</a:t>
+              <a:t>2018-07-09</a:t>
             </a:fld>
             <a:endParaRPr lang="en-CA"/>
           </a:p>
@@ -5996,7 +6325,7 @@
           <a:p>
             <a:fld id="{FC2696F7-A71E-484D-AC3A-CE094204994B}" type="datetime1">
               <a:rPr lang="en-CA" smtClean="0"/>
-              <a:t>2018-07-08</a:t>
+              <a:t>2018-07-09</a:t>
             </a:fld>
             <a:endParaRPr lang="en-CA"/>
           </a:p>
@@ -6304,7 +6633,7 @@
           <a:p>
             <a:fld id="{FF2026A3-D9E4-42EE-8898-5602D67646A6}" type="datetime1">
               <a:rPr lang="en-CA" smtClean="0"/>
-              <a:t>2018-07-08</a:t>
+              <a:t>2018-07-09</a:t>
             </a:fld>
             <a:endParaRPr lang="en-CA"/>
           </a:p>
@@ -6622,7 +6951,7 @@
           <a:p>
             <a:fld id="{382851CE-B33E-4D8E-B913-47C489FB1326}" type="datetime1">
               <a:rPr lang="en-CA" smtClean="0"/>
-              <a:t>2018-07-08</a:t>
+              <a:t>2018-07-09</a:t>
             </a:fld>
             <a:endParaRPr lang="en-CA"/>
           </a:p>
@@ -6924,7 +7253,7 @@
           <a:p>
             <a:fld id="{D0249205-445A-4022-8550-E0423D1698F6}" type="datetime1">
               <a:rPr lang="en-CA" smtClean="0"/>
-              <a:t>2018-07-08</a:t>
+              <a:t>2018-07-09</a:t>
             </a:fld>
             <a:endParaRPr lang="en-CA"/>
           </a:p>
@@ -7291,7 +7620,7 @@
           <a:p>
             <a:fld id="{4928CFC7-231B-411E-A147-D21C0786264A}" type="datetime1">
               <a:rPr lang="en-CA" smtClean="0"/>
-              <a:t>2018-07-08</a:t>
+              <a:t>2018-07-09</a:t>
             </a:fld>
             <a:endParaRPr lang="en-CA"/>
           </a:p>
@@ -7465,7 +7794,7 @@
           <a:p>
             <a:fld id="{EE4A103E-C7C6-4893-8576-55DC8ED846C7}" type="datetime1">
               <a:rPr lang="en-CA" smtClean="0"/>
-              <a:t>2018-07-08</a:t>
+              <a:t>2018-07-09</a:t>
             </a:fld>
             <a:endParaRPr lang="en-CA"/>
           </a:p>
@@ -7645,7 +7974,7 @@
           <a:p>
             <a:fld id="{E79FAEEE-621B-4F9D-B0C9-9282EED4D31D}" type="datetime1">
               <a:rPr lang="en-CA" smtClean="0"/>
-              <a:t>2018-07-08</a:t>
+              <a:t>2018-07-09</a:t>
             </a:fld>
             <a:endParaRPr lang="en-CA"/>
           </a:p>
@@ -7849,7 +8178,7 @@
           <a:p>
             <a:fld id="{D6AD7D9F-39FD-4B95-A4F0-514D658B152C}" type="datetime1">
               <a:rPr lang="en-CA" smtClean="0"/>
-              <a:t>2018-07-08</a:t>
+              <a:t>2018-07-09</a:t>
             </a:fld>
             <a:endParaRPr lang="en-CA"/>
           </a:p>
@@ -8140,7 +8469,7 @@
             <a:fld id="{7D257ED4-7149-4100-B966-397E56D6DA55}" type="datetime1">
               <a:rPr lang="en-CA" smtClean="0"/>
               <a:pPr/>
-              <a:t>2018-07-08</a:t>
+              <a:t>2018-07-09</a:t>
             </a:fld>
             <a:endParaRPr lang="en-CA"/>
           </a:p>
@@ -8583,7 +8912,7 @@
           <a:p>
             <a:fld id="{9ACE3152-893D-476F-92C8-DC87664CFA37}" type="datetime1">
               <a:rPr lang="en-CA" smtClean="0"/>
-              <a:t>2018-07-08</a:t>
+              <a:t>2018-07-09</a:t>
             </a:fld>
             <a:endParaRPr lang="en-CA"/>
           </a:p>
@@ -8965,7 +9294,7 @@
           <a:p>
             <a:fld id="{CB2930E9-C17A-4D90-BAE8-42423BBE919E}" type="datetime1">
               <a:rPr lang="en-CA" smtClean="0"/>
-              <a:t>2018-07-08</a:t>
+              <a:t>2018-07-09</a:t>
             </a:fld>
             <a:endParaRPr lang="en-CA"/>
           </a:p>
@@ -9083,7 +9412,7 @@
           <a:p>
             <a:fld id="{32659AD7-8F94-4BFD-9315-264212F1BDBC}" type="datetime1">
               <a:rPr lang="en-CA" smtClean="0"/>
-              <a:t>2018-07-08</a:t>
+              <a:t>2018-07-09</a:t>
             </a:fld>
             <a:endParaRPr lang="en-CA"/>
           </a:p>
@@ -9178,7 +9507,7 @@
           <a:p>
             <a:fld id="{DA852F67-5290-4349-8ADA-9B77C8B30CA1}" type="datetime1">
               <a:rPr lang="en-CA" smtClean="0"/>
-              <a:t>2018-07-08</a:t>
+              <a:t>2018-07-09</a:t>
             </a:fld>
             <a:endParaRPr lang="en-CA"/>
           </a:p>
@@ -9433,7 +9762,7 @@
           <a:p>
             <a:fld id="{AAA9F9A6-54E7-4285-928E-6A5CE63E658D}" type="datetime1">
               <a:rPr lang="en-CA" smtClean="0"/>
-              <a:t>2018-07-08</a:t>
+              <a:t>2018-07-09</a:t>
             </a:fld>
             <a:endParaRPr lang="en-CA"/>
           </a:p>
@@ -9716,7 +10045,7 @@
           <a:p>
             <a:fld id="{6A9DADFC-E42D-4E18-8E7A-1F87E4DC64CF}" type="datetime1">
               <a:rPr lang="en-CA" smtClean="0"/>
-              <a:t>2018-07-08</a:t>
+              <a:t>2018-07-09</a:t>
             </a:fld>
             <a:endParaRPr lang="en-CA"/>
           </a:p>
@@ -10123,7 +10452,7 @@
           <a:p>
             <a:fld id="{1046A6BF-9417-477F-B83E-822B9F56EF48}" type="datetime1">
               <a:rPr lang="en-CA" smtClean="0"/>
-              <a:t>2018-07-08</a:t>
+              <a:t>2018-07-09</a:t>
             </a:fld>
             <a:endParaRPr lang="en-CA" dirty="0"/>
           </a:p>
@@ -10933,21 +11262,21 @@
                 <a:gridCol w="1521004">
                   <a:extLst>
                     <a:ext uri="{9D8B030D-6E8A-4147-A177-3AD203B41FA5}">
-                      <a16:colId xmlns="" xmlns:a16="http://schemas.microsoft.com/office/drawing/2014/main" val="20000"/>
+                      <a16:colId xmlns:a16="http://schemas.microsoft.com/office/drawing/2014/main" xmlns="" val="20000"/>
                     </a:ext>
                   </a:extLst>
                 </a:gridCol>
                 <a:gridCol w="2807594">
                   <a:extLst>
                     <a:ext uri="{9D8B030D-6E8A-4147-A177-3AD203B41FA5}">
-                      <a16:colId xmlns="" xmlns:a16="http://schemas.microsoft.com/office/drawing/2014/main" val="20001"/>
+                      <a16:colId xmlns:a16="http://schemas.microsoft.com/office/drawing/2014/main" xmlns="" val="20001"/>
                     </a:ext>
                   </a:extLst>
                 </a:gridCol>
                 <a:gridCol w="2640169">
                   <a:extLst>
                     <a:ext uri="{9D8B030D-6E8A-4147-A177-3AD203B41FA5}">
-                      <a16:colId xmlns="" xmlns:a16="http://schemas.microsoft.com/office/drawing/2014/main" val="20002"/>
+                      <a16:colId xmlns:a16="http://schemas.microsoft.com/office/drawing/2014/main" xmlns="" val="20002"/>
                     </a:ext>
                   </a:extLst>
                 </a:gridCol>
@@ -11072,7 +11401,7 @@
                 </a:tc>
                 <a:extLst>
                   <a:ext uri="{0D108BD9-81ED-4DB2-BD59-A6C34878D82A}">
-                    <a16:rowId xmlns="" xmlns:a16="http://schemas.microsoft.com/office/drawing/2014/main" val="10000"/>
+                    <a16:rowId xmlns:a16="http://schemas.microsoft.com/office/drawing/2014/main" xmlns="" val="10000"/>
                   </a:ext>
                 </a:extLst>
               </a:tr>
@@ -11267,7 +11596,7 @@
                 </a:tc>
                 <a:extLst>
                   <a:ext uri="{0D108BD9-81ED-4DB2-BD59-A6C34878D82A}">
-                    <a16:rowId xmlns="" xmlns:a16="http://schemas.microsoft.com/office/drawing/2014/main" val="10001"/>
+                    <a16:rowId xmlns:a16="http://schemas.microsoft.com/office/drawing/2014/main" xmlns="" val="10001"/>
                   </a:ext>
                 </a:extLst>
               </a:tr>
@@ -11454,7 +11783,7 @@
                 </a:tc>
                 <a:extLst>
                   <a:ext uri="{0D108BD9-81ED-4DB2-BD59-A6C34878D82A}">
-                    <a16:rowId xmlns="" xmlns:a16="http://schemas.microsoft.com/office/drawing/2014/main" val="10002"/>
+                    <a16:rowId xmlns:a16="http://schemas.microsoft.com/office/drawing/2014/main" xmlns="" val="10002"/>
                   </a:ext>
                 </a:extLst>
               </a:tr>
@@ -11641,7 +11970,7 @@
                 </a:tc>
                 <a:extLst>
                   <a:ext uri="{0D108BD9-81ED-4DB2-BD59-A6C34878D82A}">
-                    <a16:rowId xmlns="" xmlns:a16="http://schemas.microsoft.com/office/drawing/2014/main" val="10003"/>
+                    <a16:rowId xmlns:a16="http://schemas.microsoft.com/office/drawing/2014/main" xmlns="" val="10003"/>
                   </a:ext>
                 </a:extLst>
               </a:tr>
@@ -11828,7 +12157,7 @@
                 </a:tc>
                 <a:extLst>
                   <a:ext uri="{0D108BD9-81ED-4DB2-BD59-A6C34878D82A}">
-                    <a16:rowId xmlns="" xmlns:a16="http://schemas.microsoft.com/office/drawing/2014/main" val="10004"/>
+                    <a16:rowId xmlns:a16="http://schemas.microsoft.com/office/drawing/2014/main" xmlns="" val="10004"/>
                   </a:ext>
                 </a:extLst>
               </a:tr>
@@ -11925,11 +12254,7 @@
             <a:pPr lvl="1"/>
             <a:r>
               <a:rPr lang="en-CA" dirty="0" smtClean="0"/>
-              <a:t>Transaction </a:t>
-            </a:r>
-            <a:r>
-              <a:rPr lang="en-CA" dirty="0" smtClean="0"/>
-              <a:t>aborts if journal runs out of free space</a:t>
+              <a:t>Transaction aborts if journal runs out of free space</a:t>
             </a:r>
           </a:p>
           <a:p>
@@ -18753,15 +19078,7 @@
             <a:pPr lvl="1"/>
             <a:r>
               <a:rPr lang="en-CA" dirty="0" smtClean="0"/>
-              <a:t>To </a:t>
-            </a:r>
-            <a:r>
-              <a:rPr lang="en-CA" dirty="0" smtClean="0"/>
-              <a:t>maintain, optimize, and administer </a:t>
-            </a:r>
-            <a:r>
-              <a:rPr lang="en-CA" dirty="0" smtClean="0"/>
-              <a:t>their file systems</a:t>
+              <a:t>To maintain, optimize, and administer their file systems</a:t>
             </a:r>
           </a:p>
           <a:p>
@@ -21446,7 +21763,7 @@
           <a:p>
             <a:r>
               <a:rPr lang="en-CA" dirty="0" smtClean="0"/>
-              <a:t>Limitation</a:t>
+              <a:t>Limitations</a:t>
             </a:r>
             <a:endParaRPr lang="en-CA" dirty="0"/>
           </a:p>
@@ -22391,51 +22708,9 @@
           <a:p>
             <a:r>
               <a:rPr lang="en-CA" dirty="0" smtClean="0"/>
-              <a:t>Goal</a:t>
-            </a:r>
-          </a:p>
-          <a:p>
-            <a:pPr lvl="1"/>
-            <a:r>
-              <a:rPr lang="en-CA" dirty="0" smtClean="0"/>
-              <a:t>Provide online transactional support for </a:t>
-            </a:r>
-            <a:r>
-              <a:rPr lang="en-CA" dirty="0" err="1" smtClean="0"/>
-              <a:t>eVFS</a:t>
-            </a:r>
-            <a:r>
-              <a:rPr lang="en-CA" dirty="0" smtClean="0"/>
-              <a:t> operations</a:t>
-            </a:r>
-          </a:p>
-          <a:p>
-            <a:pPr lvl="2"/>
-            <a:r>
-              <a:rPr lang="en-CA" dirty="0" smtClean="0"/>
-              <a:t>Ensure existing applications remain unaffected by </a:t>
-            </a:r>
-            <a:r>
-              <a:rPr lang="en-CA" dirty="0" err="1" smtClean="0"/>
-              <a:t>eVFS</a:t>
-            </a:r>
-            <a:r>
-              <a:rPr lang="en-CA" dirty="0" smtClean="0"/>
-              <a:t> applications</a:t>
-            </a:r>
-          </a:p>
-          <a:p>
-            <a:pPr lvl="2"/>
-            <a:r>
-              <a:rPr lang="en-CA" dirty="0" smtClean="0"/>
-              <a:t>Minimize changes to existing file system implementation</a:t>
-            </a:r>
-          </a:p>
-          <a:p>
-            <a:r>
-              <a:rPr lang="en-CA" dirty="0" smtClean="0"/>
               <a:t>Idea</a:t>
             </a:r>
+            <a:endParaRPr lang="en-CA" dirty="0" smtClean="0"/>
           </a:p>
           <a:p>
             <a:pPr lvl="1"/>
@@ -22582,14 +22857,13 @@
           <a:p>
             <a:pPr lvl="1"/>
             <a:r>
+              <a:rPr lang="en-CA" smtClean="0"/>
+              <a:t>Application works </a:t>
+            </a:r>
+            <a:r>
               <a:rPr lang="en-CA" dirty="0" smtClean="0"/>
-              <a:t>Works across </a:t>
-            </a:r>
-            <a:r>
-              <a:rPr lang="en-CA" smtClean="0"/>
-              <a:t>file systems</a:t>
-            </a:r>
-            <a:endParaRPr lang="en-CA" dirty="0" smtClean="0"/>
+              <a:t>across file systems</a:t>
+            </a:r>
           </a:p>
           <a:p>
             <a:pPr lvl="1"/>
@@ -26768,21 +27042,21 @@
                 <a:gridCol w="1376407">
                   <a:extLst>
                     <a:ext uri="{9D8B030D-6E8A-4147-A177-3AD203B41FA5}">
-                      <a16:colId xmlns="" xmlns:a16="http://schemas.microsoft.com/office/drawing/2014/main" val="20000"/>
+                      <a16:colId xmlns:a16="http://schemas.microsoft.com/office/drawing/2014/main" xmlns="" val="20000"/>
                     </a:ext>
                   </a:extLst>
                 </a:gridCol>
                 <a:gridCol w="3388710">
                   <a:extLst>
                     <a:ext uri="{9D8B030D-6E8A-4147-A177-3AD203B41FA5}">
-                      <a16:colId xmlns="" xmlns:a16="http://schemas.microsoft.com/office/drawing/2014/main" val="20001"/>
+                      <a16:colId xmlns:a16="http://schemas.microsoft.com/office/drawing/2014/main" xmlns="" val="20001"/>
                     </a:ext>
                   </a:extLst>
                 </a:gridCol>
                 <a:gridCol w="5226908">
                   <a:extLst>
                     <a:ext uri="{9D8B030D-6E8A-4147-A177-3AD203B41FA5}">
-                      <a16:colId xmlns="" xmlns:a16="http://schemas.microsoft.com/office/drawing/2014/main" val="20002"/>
+                      <a16:colId xmlns:a16="http://schemas.microsoft.com/office/drawing/2014/main" xmlns="" val="20002"/>
                     </a:ext>
                   </a:extLst>
                 </a:gridCol>
@@ -26967,7 +27241,7 @@
                 </a:tc>
                 <a:extLst>
                   <a:ext uri="{0D108BD9-81ED-4DB2-BD59-A6C34878D82A}">
-                    <a16:rowId xmlns="" xmlns:a16="http://schemas.microsoft.com/office/drawing/2014/main" val="10000"/>
+                    <a16:rowId xmlns:a16="http://schemas.microsoft.com/office/drawing/2014/main" xmlns="" val="10000"/>
                   </a:ext>
                 </a:extLst>
               </a:tr>
@@ -27577,7 +27851,7 @@
                 </a:tc>
                 <a:extLst>
                   <a:ext uri="{0D108BD9-81ED-4DB2-BD59-A6C34878D82A}">
-                    <a16:rowId xmlns="" xmlns:a16="http://schemas.microsoft.com/office/drawing/2014/main" val="10001"/>
+                    <a16:rowId xmlns:a16="http://schemas.microsoft.com/office/drawing/2014/main" xmlns="" val="10001"/>
                   </a:ext>
                 </a:extLst>
               </a:tr>
@@ -27737,7 +28011,7 @@
                 </a:tc>
                 <a:extLst>
                   <a:ext uri="{0D108BD9-81ED-4DB2-BD59-A6C34878D82A}">
-                    <a16:rowId xmlns="" xmlns:a16="http://schemas.microsoft.com/office/drawing/2014/main" val="10002"/>
+                    <a16:rowId xmlns:a16="http://schemas.microsoft.com/office/drawing/2014/main" xmlns="" val="10002"/>
                   </a:ext>
                 </a:extLst>
               </a:tr>
@@ -27872,7 +28146,7 @@
                 </a:tc>
                 <a:extLst>
                   <a:ext uri="{0D108BD9-81ED-4DB2-BD59-A6C34878D82A}">
-                    <a16:rowId xmlns="" xmlns:a16="http://schemas.microsoft.com/office/drawing/2014/main" val="10003"/>
+                    <a16:rowId xmlns:a16="http://schemas.microsoft.com/office/drawing/2014/main" xmlns="" val="10003"/>
                   </a:ext>
                 </a:extLst>
               </a:tr>
@@ -28072,7 +28346,7 @@
                 </a:tc>
                 <a:extLst>
                   <a:ext uri="{0D108BD9-81ED-4DB2-BD59-A6C34878D82A}">
-                    <a16:rowId xmlns="" xmlns:a16="http://schemas.microsoft.com/office/drawing/2014/main" val="10004"/>
+                    <a16:rowId xmlns:a16="http://schemas.microsoft.com/office/drawing/2014/main" xmlns="" val="10004"/>
                   </a:ext>
                 </a:extLst>
               </a:tr>
@@ -28305,7 +28579,7 @@
                 </a:tc>
                 <a:extLst>
                   <a:ext uri="{0D108BD9-81ED-4DB2-BD59-A6C34878D82A}">
-                    <a16:rowId xmlns="" xmlns:a16="http://schemas.microsoft.com/office/drawing/2014/main" val="10005"/>
+                    <a16:rowId xmlns:a16="http://schemas.microsoft.com/office/drawing/2014/main" xmlns="" val="10005"/>
                   </a:ext>
                 </a:extLst>
               </a:tr>
@@ -28472,7 +28746,7 @@
                 </a:tc>
                 <a:extLst>
                   <a:ext uri="{0D108BD9-81ED-4DB2-BD59-A6C34878D82A}">
-                    <a16:rowId xmlns="" xmlns:a16="http://schemas.microsoft.com/office/drawing/2014/main" val="10006"/>
+                    <a16:rowId xmlns:a16="http://schemas.microsoft.com/office/drawing/2014/main" xmlns="" val="10006"/>
                   </a:ext>
                 </a:extLst>
               </a:tr>
@@ -28615,7 +28889,7 @@
                 </a:tc>
                 <a:extLst>
                   <a:ext uri="{0D108BD9-81ED-4DB2-BD59-A6C34878D82A}">
-                    <a16:rowId xmlns="" xmlns:a16="http://schemas.microsoft.com/office/drawing/2014/main" val="10007"/>
+                    <a16:rowId xmlns:a16="http://schemas.microsoft.com/office/drawing/2014/main" xmlns="" val="10007"/>
                   </a:ext>
                 </a:extLst>
               </a:tr>
@@ -28783,7 +29057,7 @@
                 </a:tc>
                 <a:extLst>
                   <a:ext uri="{0D108BD9-81ED-4DB2-BD59-A6C34878D82A}">
-                    <a16:rowId xmlns="" xmlns:a16="http://schemas.microsoft.com/office/drawing/2014/main" val="10008"/>
+                    <a16:rowId xmlns:a16="http://schemas.microsoft.com/office/drawing/2014/main" xmlns="" val="10008"/>
                   </a:ext>
                 </a:extLst>
               </a:tr>
@@ -28968,21 +29242,21 @@
                 <a:gridCol w="1651214">
                   <a:extLst>
                     <a:ext uri="{9D8B030D-6E8A-4147-A177-3AD203B41FA5}">
-                      <a16:colId xmlns="" xmlns:a16="http://schemas.microsoft.com/office/drawing/2014/main" val="20000"/>
+                      <a16:colId xmlns:a16="http://schemas.microsoft.com/office/drawing/2014/main" xmlns="" val="20000"/>
                     </a:ext>
                   </a:extLst>
                 </a:gridCol>
                 <a:gridCol w="2545492">
                   <a:extLst>
                     <a:ext uri="{9D8B030D-6E8A-4147-A177-3AD203B41FA5}">
-                      <a16:colId xmlns="" xmlns:a16="http://schemas.microsoft.com/office/drawing/2014/main" val="20001"/>
+                      <a16:colId xmlns:a16="http://schemas.microsoft.com/office/drawing/2014/main" xmlns="" val="20001"/>
                     </a:ext>
                   </a:extLst>
                 </a:gridCol>
                 <a:gridCol w="5436973">
                   <a:extLst>
                     <a:ext uri="{9D8B030D-6E8A-4147-A177-3AD203B41FA5}">
-                      <a16:colId xmlns="" xmlns:a16="http://schemas.microsoft.com/office/drawing/2014/main" val="20002"/>
+                      <a16:colId xmlns:a16="http://schemas.microsoft.com/office/drawing/2014/main" xmlns="" val="20002"/>
                     </a:ext>
                   </a:extLst>
                 </a:gridCol>
@@ -29167,7 +29441,7 @@
                 </a:tc>
                 <a:extLst>
                   <a:ext uri="{0D108BD9-81ED-4DB2-BD59-A6C34878D82A}">
-                    <a16:rowId xmlns="" xmlns:a16="http://schemas.microsoft.com/office/drawing/2014/main" val="10000"/>
+                    <a16:rowId xmlns:a16="http://schemas.microsoft.com/office/drawing/2014/main" xmlns="" val="10000"/>
                   </a:ext>
                 </a:extLst>
               </a:tr>
@@ -29383,7 +29657,7 @@
                 </a:tc>
                 <a:extLst>
                   <a:ext uri="{0D108BD9-81ED-4DB2-BD59-A6C34878D82A}">
-                    <a16:rowId xmlns="" xmlns:a16="http://schemas.microsoft.com/office/drawing/2014/main" val="10009"/>
+                    <a16:rowId xmlns:a16="http://schemas.microsoft.com/office/drawing/2014/main" xmlns="" val="10009"/>
                   </a:ext>
                 </a:extLst>
               </a:tr>
@@ -29705,7 +29979,7 @@
                 </a:tc>
                 <a:extLst>
                   <a:ext uri="{0D108BD9-81ED-4DB2-BD59-A6C34878D82A}">
-                    <a16:rowId xmlns="" xmlns:a16="http://schemas.microsoft.com/office/drawing/2014/main" val="10010"/>
+                    <a16:rowId xmlns:a16="http://schemas.microsoft.com/office/drawing/2014/main" xmlns="" val="10010"/>
                   </a:ext>
                 </a:extLst>
               </a:tr>

</xml_diff>

<commit_message>
clarified a few points
</commit_message>
<xml_diff>
--- a/slide/evfs_talk.pptx
+++ b/slide/evfs_talk.pptx
@@ -394,11 +394,11 @@
         </c:dLbls>
         <c:marker val="1"/>
         <c:smooth val="0"/>
-        <c:axId val="328672328"/>
-        <c:axId val="328669976"/>
+        <c:axId val="306746176"/>
+        <c:axId val="306746960"/>
       </c:lineChart>
       <c:catAx>
-        <c:axId val="328672328"/>
+        <c:axId val="306746176"/>
         <c:scaling>
           <c:orientation val="minMax"/>
         </c:scaling>
@@ -499,7 +499,7 @@
             <a:endParaRPr lang="en-US"/>
           </a:p>
         </c:txPr>
-        <c:crossAx val="328669976"/>
+        <c:crossAx val="306746960"/>
         <c:crosses val="autoZero"/>
         <c:auto val="0"/>
         <c:lblAlgn val="ctr"/>
@@ -507,7 +507,7 @@
         <c:noMultiLvlLbl val="0"/>
       </c:catAx>
       <c:valAx>
-        <c:axId val="328669976"/>
+        <c:axId val="306746960"/>
         <c:scaling>
           <c:logBase val="4"/>
           <c:orientation val="minMax"/>
@@ -550,6 +550,7 @@
               </a:p>
             </c:rich>
           </c:tx>
+          <c:layout/>
           <c:overlay val="0"/>
           <c:spPr>
             <a:noFill/>
@@ -604,7 +605,7 @@
             <a:endParaRPr lang="en-US"/>
           </a:p>
         </c:txPr>
-        <c:crossAx val="328672328"/>
+        <c:crossAx val="306746176"/>
         <c:crosses val="autoZero"/>
         <c:crossBetween val="between"/>
       </c:valAx>
@@ -3222,7 +3223,35 @@
             </a:r>
             <a:r>
               <a:rPr lang="en-CA" baseline="0" dirty="0" smtClean="0"/>
-              <a:t> and recreates it on the destination file system. It does so by first allocating the extents on the destination file system without changing the original content, as shown on line 4, and then recreate the mapping of each extent to the new </a:t>
+              <a:t> and recreates </a:t>
+            </a:r>
+            <a:r>
+              <a:rPr lang="en-CA" baseline="0" dirty="0" smtClean="0"/>
+              <a:t>just the metadata </a:t>
+            </a:r>
+            <a:r>
+              <a:rPr lang="en-CA" baseline="0" dirty="0" smtClean="0"/>
+              <a:t>on the destination file system. It does so by first allocating the extents on the destination file </a:t>
+            </a:r>
+            <a:r>
+              <a:rPr lang="en-CA" baseline="0" dirty="0" smtClean="0"/>
+              <a:t>system, </a:t>
+            </a:r>
+            <a:r>
+              <a:rPr lang="en-CA" baseline="0" dirty="0" smtClean="0"/>
+              <a:t>as shown on line </a:t>
+            </a:r>
+            <a:r>
+              <a:rPr lang="en-CA" baseline="0" dirty="0" smtClean="0"/>
+              <a:t>4. Note that the function does not wipe or otherwise change the content of the extent. Next, the </a:t>
+            </a:r>
+            <a:r>
+              <a:rPr lang="en-CA" baseline="0" smtClean="0"/>
+              <a:t>conversion tool recreate </a:t>
+            </a:r>
+            <a:r>
+              <a:rPr lang="en-CA" baseline="0" dirty="0" smtClean="0"/>
+              <a:t>the mapping of each extent to the new </a:t>
             </a:r>
             <a:r>
               <a:rPr lang="en-CA" baseline="0" dirty="0" err="1" smtClean="0"/>
@@ -3246,11 +3275,7 @@
             </a:r>
             <a:r>
               <a:rPr lang="en-CA" baseline="0" dirty="0" smtClean="0"/>
-              <a:t> as described earlier. Next, we’ll discuss </a:t>
-            </a:r>
-            <a:r>
-              <a:rPr lang="en-CA" baseline="0" dirty="0" smtClean="0"/>
-              <a:t>how journaling reduces the memory overhead of the conversion tool.</a:t>
+              <a:t> as described earlier. Next, we’ll discuss how journaling reduces the memory overhead of the conversion tool.</a:t>
             </a:r>
             <a:endParaRPr lang="en-CA" dirty="0"/>
           </a:p>
@@ -3350,11 +3375,7 @@
             </a:r>
             <a:r>
               <a:rPr lang="en-CA" baseline="0" dirty="0" smtClean="0"/>
-              <a:t>During </a:t>
-            </a:r>
-            <a:r>
-              <a:rPr lang="en-CA" baseline="0" dirty="0" smtClean="0"/>
-              <a:t>our evaluation, we find that our journaling implementation has a small overhead of at most 20%, which is a small price to pay considering the danger of data loss during file system conversion. </a:t>
+              <a:t>During our evaluation, we find that our journaling implementation has a small overhead of at most 20%, which is a small price to pay considering the danger of data loss during file system conversion. </a:t>
             </a:r>
             <a:r>
               <a:rPr lang="en-CA" sz="1200" b="0" i="0" kern="1200" dirty="0" smtClean="0">
@@ -3370,11 +3391,15 @@
             </a:r>
             <a:r>
               <a:rPr lang="en-CA" baseline="0" dirty="0" smtClean="0"/>
-              <a:t>also </a:t>
+              <a:t>also reduces the memory overhead of the conversion tool. When journaling is enabled, we are able to read the source file system while writing the destination file system since before the transaction is committed, the source file system is still intact and not overwritten. However, without journaling, the source file system may be overwritten by the destination file system and therefore our previous version of the conversion tool had to read the entire source file system metadata into memory before writing out the destination file system, which would require </a:t>
             </a:r>
             <a:r>
               <a:rPr lang="en-CA" baseline="0" dirty="0" smtClean="0"/>
-              <a:t>reduces the memory overhead of the conversion tool. When journaling is enabled, we are able to read the source file system while writing the destination file system since before the transaction is committed, the source file system is still intact and not overwritten. However, without journaling, the source file system may be overwritten by the destination file system and therefore our previous version of the conversion tool had to read the entire source file system metadata into memory before writing out the destination file system, which would require excessive an amount of memory for very large file systems.</a:t>
+              <a:t>excessive </a:t>
+            </a:r>
+            <a:r>
+              <a:rPr lang="en-CA" baseline="0" dirty="0" smtClean="0"/>
+              <a:t>amount of memory for very large file systems.</a:t>
             </a:r>
             <a:endParaRPr lang="en-CA" dirty="0"/>
           </a:p>
@@ -3468,7 +3493,6 @@
               <a:rPr lang="en-CA" baseline="0" dirty="0" smtClean="0"/>
               <a:t> discuss the main take away of our work in terms of design trade offs. On the leftmost side in this diagram, we have VFS, which provides the most generic API and is able to support all file systems. However, it provides the least control, and thus can only work for applications that operate at the file level. </a:t>
             </a:r>
-            <a:endParaRPr lang="en-CA" baseline="0" dirty="0" smtClean="0"/>
           </a:p>
           <a:p>
             <a:r>
@@ -3485,19 +3509,7 @@
             </a:r>
             <a:r>
               <a:rPr lang="en-CA" baseline="0" dirty="0" smtClean="0"/>
-              <a:t>are </a:t>
-            </a:r>
-            <a:r>
-              <a:rPr lang="en-CA" baseline="0" dirty="0" smtClean="0"/>
-              <a:t>file system specific and provides full control to the programmer at the cost of complexity and lack of generality. In between, we have Spiffy, which provides type-safe access to data structures </a:t>
-            </a:r>
-            <a:r>
-              <a:rPr lang="en-CA" baseline="0" dirty="0" smtClean="0"/>
-              <a:t>and it </a:t>
-            </a:r>
-            <a:r>
-              <a:rPr lang="en-CA" baseline="0" dirty="0" smtClean="0"/>
-              <a:t>simplifies traversal of the file system tree. However, it only knows about the types of data structures but not the semantics, such as the meaning of an </a:t>
+              <a:t>are file system specific and provides full control to the programmer at the cost of complexity and lack of generality. In between, we have Spiffy, which provides type-safe access to data structures and it simplifies traversal of the file system tree. However, it only knows about the types of data structures but not the semantics, such as the meaning of an </a:t>
             </a:r>
             <a:r>
               <a:rPr lang="en-CA" baseline="0" dirty="0" err="1" smtClean="0"/>
@@ -3505,7 +3517,15 @@
             </a:r>
             <a:r>
               <a:rPr lang="en-CA" baseline="0" dirty="0" smtClean="0"/>
-              <a:t>, making it still file system specific. Therefore, we arrived at </a:t>
+              <a:t>, making it still file system specific. Therefore, we </a:t>
+            </a:r>
+            <a:r>
+              <a:rPr lang="en-CA" baseline="0" dirty="0" smtClean="0"/>
+              <a:t>arrive </a:t>
+            </a:r>
+            <a:r>
+              <a:rPr lang="en-CA" baseline="0" dirty="0" smtClean="0"/>
+              <a:t>at </a:t>
             </a:r>
             <a:r>
               <a:rPr lang="en-CA" baseline="0" dirty="0" err="1" smtClean="0"/>
@@ -4935,11 +4955,7 @@
             </a:r>
             <a:r>
               <a:rPr lang="en-CA" baseline="0" dirty="0" smtClean="0"/>
-              <a:t> </a:t>
-            </a:r>
-            <a:r>
-              <a:rPr lang="en-CA" baseline="0" dirty="0" smtClean="0"/>
-              <a:t>the ability to make a new file system on a device, or update the settings of an existing file system, such as changing the label or toggling file system features. </a:t>
+              <a:t> the ability to make a new file system on a device, or update the settings of an existing file system, such as changing the label or toggling file system features. </a:t>
             </a:r>
             <a:endParaRPr lang="en-CA" dirty="0" smtClean="0"/>
           </a:p>
@@ -4963,19 +4979,11 @@
             </a:pPr>
             <a:r>
               <a:rPr lang="en-CA" dirty="0" smtClean="0"/>
-              <a:t>Many </a:t>
-            </a:r>
-            <a:r>
-              <a:rPr lang="en-CA" dirty="0" smtClean="0"/>
-              <a:t>file system</a:t>
+              <a:t>Many file system</a:t>
             </a:r>
             <a:r>
               <a:rPr lang="en-CA" baseline="0" dirty="0" smtClean="0"/>
-              <a:t> management tools require the ability to control the physical layout of the data blocks on disk, for example, defragmentation tools and garbage collectors need to move data blocks from one physical location to another</a:t>
-            </a:r>
-            <a:r>
-              <a:rPr lang="en-CA" baseline="0" dirty="0" smtClean="0"/>
-              <a:t>.</a:t>
+              <a:t> management tools require the ability to control the physical layout of the data blocks on disk, for example, defragmentation tools and garbage collectors need to move data blocks from one physical location to another.</a:t>
             </a:r>
           </a:p>
           <a:p>
@@ -5137,23 +5145,11 @@
             </a:pPr>
             <a:r>
               <a:rPr lang="en-CA" dirty="0" smtClean="0"/>
-              <a:t>Similarly</a:t>
-            </a:r>
-            <a:r>
-              <a:rPr lang="en-CA" dirty="0" smtClean="0"/>
-              <a:t>, there are operations which</a:t>
+              <a:t>Similarly, there are operations which</a:t>
             </a:r>
             <a:r>
               <a:rPr lang="en-CA" baseline="0" dirty="0" smtClean="0"/>
-              <a:t> </a:t>
-            </a:r>
-            <a:r>
-              <a:rPr lang="en-CA" baseline="0" dirty="0" smtClean="0"/>
-              <a:t>work </a:t>
-            </a:r>
-            <a:r>
-              <a:rPr lang="en-CA" baseline="0" dirty="0" smtClean="0"/>
-              <a:t>with </a:t>
+              <a:t> work with </a:t>
             </a:r>
             <a:r>
               <a:rPr lang="en-CA" baseline="0" dirty="0" err="1" smtClean="0"/>
@@ -5185,15 +5181,7 @@
             </a:r>
             <a:r>
               <a:rPr lang="en-CA" baseline="0" dirty="0" smtClean="0"/>
-              <a:t> write </a:t>
-            </a:r>
-            <a:r>
-              <a:rPr lang="en-CA" baseline="0" dirty="0" smtClean="0"/>
-              <a:t>provide </a:t>
-            </a:r>
-            <a:r>
-              <a:rPr lang="en-CA" baseline="0" dirty="0" smtClean="0"/>
-              <a:t>the same functionality as VFS read and write, and are necessary for reading from or writing to </a:t>
+              <a:t> write provide the same functionality as VFS read and write, and are necessary for reading from or writing to </a:t>
             </a:r>
             <a:r>
               <a:rPr lang="en-CA" baseline="0" dirty="0" err="1" smtClean="0"/>
@@ -11262,21 +11250,21 @@
                 <a:gridCol w="1521004">
                   <a:extLst>
                     <a:ext uri="{9D8B030D-6E8A-4147-A177-3AD203B41FA5}">
-                      <a16:colId xmlns:a16="http://schemas.microsoft.com/office/drawing/2014/main" xmlns="" val="20000"/>
+                      <a16:colId xmlns="" xmlns:a16="http://schemas.microsoft.com/office/drawing/2014/main" val="20000"/>
                     </a:ext>
                   </a:extLst>
                 </a:gridCol>
                 <a:gridCol w="2807594">
                   <a:extLst>
                     <a:ext uri="{9D8B030D-6E8A-4147-A177-3AD203B41FA5}">
-                      <a16:colId xmlns:a16="http://schemas.microsoft.com/office/drawing/2014/main" xmlns="" val="20001"/>
+                      <a16:colId xmlns="" xmlns:a16="http://schemas.microsoft.com/office/drawing/2014/main" val="20001"/>
                     </a:ext>
                   </a:extLst>
                 </a:gridCol>
                 <a:gridCol w="2640169">
                   <a:extLst>
                     <a:ext uri="{9D8B030D-6E8A-4147-A177-3AD203B41FA5}">
-                      <a16:colId xmlns:a16="http://schemas.microsoft.com/office/drawing/2014/main" xmlns="" val="20002"/>
+                      <a16:colId xmlns="" xmlns:a16="http://schemas.microsoft.com/office/drawing/2014/main" val="20002"/>
                     </a:ext>
                   </a:extLst>
                 </a:gridCol>
@@ -11401,7 +11389,7 @@
                 </a:tc>
                 <a:extLst>
                   <a:ext uri="{0D108BD9-81ED-4DB2-BD59-A6C34878D82A}">
-                    <a16:rowId xmlns:a16="http://schemas.microsoft.com/office/drawing/2014/main" xmlns="" val="10000"/>
+                    <a16:rowId xmlns="" xmlns:a16="http://schemas.microsoft.com/office/drawing/2014/main" val="10000"/>
                   </a:ext>
                 </a:extLst>
               </a:tr>
@@ -11596,7 +11584,7 @@
                 </a:tc>
                 <a:extLst>
                   <a:ext uri="{0D108BD9-81ED-4DB2-BD59-A6C34878D82A}">
-                    <a16:rowId xmlns:a16="http://schemas.microsoft.com/office/drawing/2014/main" xmlns="" val="10001"/>
+                    <a16:rowId xmlns="" xmlns:a16="http://schemas.microsoft.com/office/drawing/2014/main" val="10001"/>
                   </a:ext>
                 </a:extLst>
               </a:tr>
@@ -11783,7 +11771,7 @@
                 </a:tc>
                 <a:extLst>
                   <a:ext uri="{0D108BD9-81ED-4DB2-BD59-A6C34878D82A}">
-                    <a16:rowId xmlns:a16="http://schemas.microsoft.com/office/drawing/2014/main" xmlns="" val="10002"/>
+                    <a16:rowId xmlns="" xmlns:a16="http://schemas.microsoft.com/office/drawing/2014/main" val="10002"/>
                   </a:ext>
                 </a:extLst>
               </a:tr>
@@ -11970,7 +11958,7 @@
                 </a:tc>
                 <a:extLst>
                   <a:ext uri="{0D108BD9-81ED-4DB2-BD59-A6C34878D82A}">
-                    <a16:rowId xmlns:a16="http://schemas.microsoft.com/office/drawing/2014/main" xmlns="" val="10003"/>
+                    <a16:rowId xmlns="" xmlns:a16="http://schemas.microsoft.com/office/drawing/2014/main" val="10003"/>
                   </a:ext>
                 </a:extLst>
               </a:tr>
@@ -12157,7 +12145,7 @@
                 </a:tc>
                 <a:extLst>
                   <a:ext uri="{0D108BD9-81ED-4DB2-BD59-A6C34878D82A}">
-                    <a16:rowId xmlns:a16="http://schemas.microsoft.com/office/drawing/2014/main" xmlns="" val="10004"/>
+                    <a16:rowId xmlns="" xmlns:a16="http://schemas.microsoft.com/office/drawing/2014/main" val="10004"/>
                   </a:ext>
                 </a:extLst>
               </a:tr>
@@ -12175,6 +12163,13 @@
   <p:clrMapOvr>
     <a:masterClrMapping/>
   </p:clrMapOvr>
+  <p:timing>
+    <p:tnLst>
+      <p:par>
+        <p:cTn id="1" dur="indefinite" restart="never" nodeType="tmRoot"/>
+      </p:par>
+    </p:tnLst>
+  </p:timing>
 </p:sld>
 </file>
 
@@ -12803,6 +12798,13 @@
   <p:clrMapOvr>
     <a:masterClrMapping/>
   </p:clrMapOvr>
+  <p:timing>
+    <p:tnLst>
+      <p:par>
+        <p:cTn id="1" dur="indefinite" restart="never" nodeType="tmRoot"/>
+      </p:par>
+    </p:tnLst>
+  </p:timing>
 </p:sld>
 </file>
 
@@ -13535,6 +13537,13 @@
   <p:clrMapOvr>
     <a:masterClrMapping/>
   </p:clrMapOvr>
+  <p:timing>
+    <p:tnLst>
+      <p:par>
+        <p:cTn id="1" dur="indefinite" restart="never" nodeType="tmRoot"/>
+      </p:par>
+    </p:tnLst>
+  </p:timing>
 </p:sld>
 </file>
 
@@ -14256,6 +14265,13 @@
   <p:clrMapOvr>
     <a:masterClrMapping/>
   </p:clrMapOvr>
+  <p:timing>
+    <p:tnLst>
+      <p:par>
+        <p:cTn id="1" dur="indefinite" restart="never" nodeType="tmRoot"/>
+      </p:par>
+    </p:tnLst>
+  </p:timing>
 </p:sld>
 </file>
 
@@ -15057,6 +15073,13 @@
   <p:clrMapOvr>
     <a:masterClrMapping/>
   </p:clrMapOvr>
+  <p:timing>
+    <p:tnLst>
+      <p:par>
+        <p:cTn id="1" dur="indefinite" restart="never" nodeType="tmRoot"/>
+      </p:par>
+    </p:tnLst>
+  </p:timing>
 </p:sld>
 </file>
 
@@ -15817,6 +15840,13 @@
   <p:clrMapOvr>
     <a:masterClrMapping/>
   </p:clrMapOvr>
+  <p:timing>
+    <p:tnLst>
+      <p:par>
+        <p:cTn id="1" dur="indefinite" restart="never" nodeType="tmRoot"/>
+      </p:par>
+    </p:tnLst>
+  </p:timing>
 </p:sld>
 </file>
 
@@ -16736,6 +16766,13 @@
   <p:clrMapOvr>
     <a:masterClrMapping/>
   </p:clrMapOvr>
+  <p:timing>
+    <p:tnLst>
+      <p:par>
+        <p:cTn id="1" dur="indefinite" restart="never" nodeType="tmRoot"/>
+      </p:par>
+    </p:tnLst>
+  </p:timing>
 </p:sld>
 </file>
 
@@ -17789,6 +17826,13 @@
   <p:clrMapOvr>
     <a:masterClrMapping/>
   </p:clrMapOvr>
+  <p:timing>
+    <p:tnLst>
+      <p:par>
+        <p:cTn id="1" dur="indefinite" restart="never" nodeType="tmRoot"/>
+      </p:par>
+    </p:tnLst>
+  </p:timing>
 </p:sld>
 </file>
 
@@ -18762,6 +18806,13 @@
   <p:clrMapOvr>
     <a:masterClrMapping/>
   </p:clrMapOvr>
+  <p:timing>
+    <p:tnLst>
+      <p:par>
+        <p:cTn id="1" dur="indefinite" restart="never" nodeType="tmRoot"/>
+      </p:par>
+    </p:tnLst>
+  </p:timing>
 </p:sld>
 </file>
 
@@ -20065,6 +20116,13 @@
   <p:clrMapOvr>
     <a:masterClrMapping/>
   </p:clrMapOvr>
+  <p:timing>
+    <p:tnLst>
+      <p:par>
+        <p:cTn id="1" dur="indefinite" restart="never" nodeType="tmRoot"/>
+      </p:par>
+    </p:tnLst>
+  </p:timing>
 </p:sld>
 </file>
 
@@ -20730,6 +20788,13 @@
   <p:clrMapOvr>
     <a:masterClrMapping/>
   </p:clrMapOvr>
+  <p:timing>
+    <p:tnLst>
+      <p:par>
+        <p:cTn id="1" dur="indefinite" restart="never" nodeType="tmRoot"/>
+      </p:par>
+    </p:tnLst>
+  </p:timing>
 </p:sld>
 </file>
 
@@ -20863,6 +20928,13 @@
   <p:clrMapOvr>
     <a:masterClrMapping/>
   </p:clrMapOvr>
+  <p:timing>
+    <p:tnLst>
+      <p:par>
+        <p:cTn id="1" dur="indefinite" restart="never" nodeType="tmRoot"/>
+      </p:par>
+    </p:tnLst>
+  </p:timing>
 </p:sld>
 </file>
 
@@ -21726,6 +21798,13 @@
   <p:clrMapOvr>
     <a:masterClrMapping/>
   </p:clrMapOvr>
+  <p:timing>
+    <p:tnLst>
+      <p:par>
+        <p:cTn id="1" dur="indefinite" restart="never" nodeType="tmRoot"/>
+      </p:par>
+    </p:tnLst>
+  </p:timing>
 </p:sld>
 </file>
 
@@ -22623,6 +22702,13 @@
   <p:clrMapOvr>
     <a:masterClrMapping/>
   </p:clrMapOvr>
+  <p:timing>
+    <p:tnLst>
+      <p:par>
+        <p:cTn id="1" dur="indefinite" restart="never" nodeType="tmRoot"/>
+      </p:par>
+    </p:tnLst>
+  </p:timing>
 </p:sld>
 </file>
 
@@ -22710,7 +22796,6 @@
               <a:rPr lang="en-CA" dirty="0" smtClean="0"/>
               <a:t>Idea</a:t>
             </a:r>
-            <a:endParaRPr lang="en-CA" dirty="0" smtClean="0"/>
           </a:p>
           <a:p>
             <a:pPr lvl="1"/>
@@ -22762,6 +22847,13 @@
   <p:clrMapOvr>
     <a:masterClrMapping/>
   </p:clrMapOvr>
+  <p:timing>
+    <p:tnLst>
+      <p:par>
+        <p:cTn id="1" dur="indefinite" restart="never" nodeType="tmRoot"/>
+      </p:par>
+    </p:tnLst>
+  </p:timing>
 </p:sld>
 </file>
 
@@ -22905,6 +22997,13 @@
   <p:clrMapOvr>
     <a:masterClrMapping/>
   </p:clrMapOvr>
+  <p:timing>
+    <p:tnLst>
+      <p:par>
+        <p:cTn id="1" dur="indefinite" restart="never" nodeType="tmRoot"/>
+      </p:par>
+    </p:tnLst>
+  </p:timing>
 </p:sld>
 </file>
 
@@ -26783,6 +26882,13 @@
   <p:clrMapOvr>
     <a:masterClrMapping/>
   </p:clrMapOvr>
+  <p:timing>
+    <p:tnLst>
+      <p:par>
+        <p:cTn id="1" dur="indefinite" restart="never" nodeType="tmRoot"/>
+      </p:par>
+    </p:tnLst>
+  </p:timing>
 </p:sld>
 </file>
 
@@ -26966,6 +27072,13 @@
   <p:clrMapOvr>
     <a:masterClrMapping/>
   </p:clrMapOvr>
+  <p:timing>
+    <p:tnLst>
+      <p:par>
+        <p:cTn id="1" dur="indefinite" restart="never" nodeType="tmRoot"/>
+      </p:par>
+    </p:tnLst>
+  </p:timing>
 </p:sld>
 </file>
 
@@ -27042,21 +27155,21 @@
                 <a:gridCol w="1376407">
                   <a:extLst>
                     <a:ext uri="{9D8B030D-6E8A-4147-A177-3AD203B41FA5}">
-                      <a16:colId xmlns:a16="http://schemas.microsoft.com/office/drawing/2014/main" xmlns="" val="20000"/>
+                      <a16:colId xmlns="" xmlns:a16="http://schemas.microsoft.com/office/drawing/2014/main" val="20000"/>
                     </a:ext>
                   </a:extLst>
                 </a:gridCol>
                 <a:gridCol w="3388710">
                   <a:extLst>
                     <a:ext uri="{9D8B030D-6E8A-4147-A177-3AD203B41FA5}">
-                      <a16:colId xmlns:a16="http://schemas.microsoft.com/office/drawing/2014/main" xmlns="" val="20001"/>
+                      <a16:colId xmlns="" xmlns:a16="http://schemas.microsoft.com/office/drawing/2014/main" val="20001"/>
                     </a:ext>
                   </a:extLst>
                 </a:gridCol>
                 <a:gridCol w="5226908">
                   <a:extLst>
                     <a:ext uri="{9D8B030D-6E8A-4147-A177-3AD203B41FA5}">
-                      <a16:colId xmlns:a16="http://schemas.microsoft.com/office/drawing/2014/main" xmlns="" val="20002"/>
+                      <a16:colId xmlns="" xmlns:a16="http://schemas.microsoft.com/office/drawing/2014/main" val="20002"/>
                     </a:ext>
                   </a:extLst>
                 </a:gridCol>
@@ -27241,7 +27354,7 @@
                 </a:tc>
                 <a:extLst>
                   <a:ext uri="{0D108BD9-81ED-4DB2-BD59-A6C34878D82A}">
-                    <a16:rowId xmlns:a16="http://schemas.microsoft.com/office/drawing/2014/main" xmlns="" val="10000"/>
+                    <a16:rowId xmlns="" xmlns:a16="http://schemas.microsoft.com/office/drawing/2014/main" val="10000"/>
                   </a:ext>
                 </a:extLst>
               </a:tr>
@@ -27851,7 +27964,7 @@
                 </a:tc>
                 <a:extLst>
                   <a:ext uri="{0D108BD9-81ED-4DB2-BD59-A6C34878D82A}">
-                    <a16:rowId xmlns:a16="http://schemas.microsoft.com/office/drawing/2014/main" xmlns="" val="10001"/>
+                    <a16:rowId xmlns="" xmlns:a16="http://schemas.microsoft.com/office/drawing/2014/main" val="10001"/>
                   </a:ext>
                 </a:extLst>
               </a:tr>
@@ -28011,7 +28124,7 @@
                 </a:tc>
                 <a:extLst>
                   <a:ext uri="{0D108BD9-81ED-4DB2-BD59-A6C34878D82A}">
-                    <a16:rowId xmlns:a16="http://schemas.microsoft.com/office/drawing/2014/main" xmlns="" val="10002"/>
+                    <a16:rowId xmlns="" xmlns:a16="http://schemas.microsoft.com/office/drawing/2014/main" val="10002"/>
                   </a:ext>
                 </a:extLst>
               </a:tr>
@@ -28146,7 +28259,7 @@
                 </a:tc>
                 <a:extLst>
                   <a:ext uri="{0D108BD9-81ED-4DB2-BD59-A6C34878D82A}">
-                    <a16:rowId xmlns:a16="http://schemas.microsoft.com/office/drawing/2014/main" xmlns="" val="10003"/>
+                    <a16:rowId xmlns="" xmlns:a16="http://schemas.microsoft.com/office/drawing/2014/main" val="10003"/>
                   </a:ext>
                 </a:extLst>
               </a:tr>
@@ -28346,7 +28459,7 @@
                 </a:tc>
                 <a:extLst>
                   <a:ext uri="{0D108BD9-81ED-4DB2-BD59-A6C34878D82A}">
-                    <a16:rowId xmlns:a16="http://schemas.microsoft.com/office/drawing/2014/main" xmlns="" val="10004"/>
+                    <a16:rowId xmlns="" xmlns:a16="http://schemas.microsoft.com/office/drawing/2014/main" val="10004"/>
                   </a:ext>
                 </a:extLst>
               </a:tr>
@@ -28579,7 +28692,7 @@
                 </a:tc>
                 <a:extLst>
                   <a:ext uri="{0D108BD9-81ED-4DB2-BD59-A6C34878D82A}">
-                    <a16:rowId xmlns:a16="http://schemas.microsoft.com/office/drawing/2014/main" xmlns="" val="10005"/>
+                    <a16:rowId xmlns="" xmlns:a16="http://schemas.microsoft.com/office/drawing/2014/main" val="10005"/>
                   </a:ext>
                 </a:extLst>
               </a:tr>
@@ -28746,7 +28859,7 @@
                 </a:tc>
                 <a:extLst>
                   <a:ext uri="{0D108BD9-81ED-4DB2-BD59-A6C34878D82A}">
-                    <a16:rowId xmlns:a16="http://schemas.microsoft.com/office/drawing/2014/main" xmlns="" val="10006"/>
+                    <a16:rowId xmlns="" xmlns:a16="http://schemas.microsoft.com/office/drawing/2014/main" val="10006"/>
                   </a:ext>
                 </a:extLst>
               </a:tr>
@@ -28889,7 +29002,7 @@
                 </a:tc>
                 <a:extLst>
                   <a:ext uri="{0D108BD9-81ED-4DB2-BD59-A6C34878D82A}">
-                    <a16:rowId xmlns:a16="http://schemas.microsoft.com/office/drawing/2014/main" xmlns="" val="10007"/>
+                    <a16:rowId xmlns="" xmlns:a16="http://schemas.microsoft.com/office/drawing/2014/main" val="10007"/>
                   </a:ext>
                 </a:extLst>
               </a:tr>
@@ -29057,7 +29170,7 @@
                 </a:tc>
                 <a:extLst>
                   <a:ext uri="{0D108BD9-81ED-4DB2-BD59-A6C34878D82A}">
-                    <a16:rowId xmlns:a16="http://schemas.microsoft.com/office/drawing/2014/main" xmlns="" val="10008"/>
+                    <a16:rowId xmlns="" xmlns:a16="http://schemas.microsoft.com/office/drawing/2014/main" val="10008"/>
                   </a:ext>
                 </a:extLst>
               </a:tr>
@@ -29099,6 +29212,13 @@
   <p:clrMapOvr>
     <a:masterClrMapping/>
   </p:clrMapOvr>
+  <p:timing>
+    <p:tnLst>
+      <p:par>
+        <p:cTn id="1" dur="indefinite" restart="never" nodeType="tmRoot"/>
+      </p:par>
+    </p:tnLst>
+  </p:timing>
 </p:sld>
 </file>
 
@@ -29242,21 +29362,21 @@
                 <a:gridCol w="1651214">
                   <a:extLst>
                     <a:ext uri="{9D8B030D-6E8A-4147-A177-3AD203B41FA5}">
-                      <a16:colId xmlns:a16="http://schemas.microsoft.com/office/drawing/2014/main" xmlns="" val="20000"/>
+                      <a16:colId xmlns="" xmlns:a16="http://schemas.microsoft.com/office/drawing/2014/main" val="20000"/>
                     </a:ext>
                   </a:extLst>
                 </a:gridCol>
                 <a:gridCol w="2545492">
                   <a:extLst>
                     <a:ext uri="{9D8B030D-6E8A-4147-A177-3AD203B41FA5}">
-                      <a16:colId xmlns:a16="http://schemas.microsoft.com/office/drawing/2014/main" xmlns="" val="20001"/>
+                      <a16:colId xmlns="" xmlns:a16="http://schemas.microsoft.com/office/drawing/2014/main" val="20001"/>
                     </a:ext>
                   </a:extLst>
                 </a:gridCol>
                 <a:gridCol w="5436973">
                   <a:extLst>
                     <a:ext uri="{9D8B030D-6E8A-4147-A177-3AD203B41FA5}">
-                      <a16:colId xmlns:a16="http://schemas.microsoft.com/office/drawing/2014/main" xmlns="" val="20002"/>
+                      <a16:colId xmlns="" xmlns:a16="http://schemas.microsoft.com/office/drawing/2014/main" val="20002"/>
                     </a:ext>
                   </a:extLst>
                 </a:gridCol>
@@ -29441,7 +29561,7 @@
                 </a:tc>
                 <a:extLst>
                   <a:ext uri="{0D108BD9-81ED-4DB2-BD59-A6C34878D82A}">
-                    <a16:rowId xmlns:a16="http://schemas.microsoft.com/office/drawing/2014/main" xmlns="" val="10000"/>
+                    <a16:rowId xmlns="" xmlns:a16="http://schemas.microsoft.com/office/drawing/2014/main" val="10000"/>
                   </a:ext>
                 </a:extLst>
               </a:tr>
@@ -29657,7 +29777,7 @@
                 </a:tc>
                 <a:extLst>
                   <a:ext uri="{0D108BD9-81ED-4DB2-BD59-A6C34878D82A}">
-                    <a16:rowId xmlns:a16="http://schemas.microsoft.com/office/drawing/2014/main" xmlns="" val="10009"/>
+                    <a16:rowId xmlns="" xmlns:a16="http://schemas.microsoft.com/office/drawing/2014/main" val="10009"/>
                   </a:ext>
                 </a:extLst>
               </a:tr>
@@ -29979,7 +30099,7 @@
                 </a:tc>
                 <a:extLst>
                   <a:ext uri="{0D108BD9-81ED-4DB2-BD59-A6C34878D82A}">
-                    <a16:rowId xmlns:a16="http://schemas.microsoft.com/office/drawing/2014/main" xmlns="" val="10010"/>
+                    <a16:rowId xmlns="" xmlns:a16="http://schemas.microsoft.com/office/drawing/2014/main" val="10010"/>
                   </a:ext>
                 </a:extLst>
               </a:tr>
@@ -30502,6 +30622,13 @@
   <p:clrMapOvr>
     <a:masterClrMapping/>
   </p:clrMapOvr>
+  <p:timing>
+    <p:tnLst>
+      <p:par>
+        <p:cTn id="1" dur="indefinite" restart="never" nodeType="tmRoot"/>
+      </p:par>
+    </p:tnLst>
+  </p:timing>
 </p:sld>
 </file>
 

</xml_diff>